<commit_message>
Changed presentation. Code refactor.
</commit_message>
<xml_diff>
--- a/Presentation.pptx
+++ b/Presentation.pptx
@@ -7,20 +7,21 @@
   <p:sldIdLst>
     <p:sldId id="257" r:id="rId2"/>
     <p:sldId id="258" r:id="rId3"/>
-    <p:sldId id="269" r:id="rId4"/>
-    <p:sldId id="270" r:id="rId5"/>
-    <p:sldId id="271" r:id="rId6"/>
-    <p:sldId id="272" r:id="rId7"/>
-    <p:sldId id="273" r:id="rId8"/>
-    <p:sldId id="275" r:id="rId9"/>
-    <p:sldId id="276" r:id="rId10"/>
-    <p:sldId id="277" r:id="rId11"/>
-    <p:sldId id="278" r:id="rId12"/>
-    <p:sldId id="279" r:id="rId13"/>
-    <p:sldId id="280" r:id="rId14"/>
-    <p:sldId id="281" r:id="rId15"/>
-    <p:sldId id="282" r:id="rId16"/>
-    <p:sldId id="274" r:id="rId17"/>
+    <p:sldId id="283" r:id="rId4"/>
+    <p:sldId id="269" r:id="rId5"/>
+    <p:sldId id="270" r:id="rId6"/>
+    <p:sldId id="271" r:id="rId7"/>
+    <p:sldId id="272" r:id="rId8"/>
+    <p:sldId id="273" r:id="rId9"/>
+    <p:sldId id="275" r:id="rId10"/>
+    <p:sldId id="276" r:id="rId11"/>
+    <p:sldId id="277" r:id="rId12"/>
+    <p:sldId id="278" r:id="rId13"/>
+    <p:sldId id="279" r:id="rId14"/>
+    <p:sldId id="280" r:id="rId15"/>
+    <p:sldId id="281" r:id="rId16"/>
+    <p:sldId id="282" r:id="rId17"/>
+    <p:sldId id="274" r:id="rId18"/>
   </p:sldIdLst>
   <p:sldSz cx="12192000" cy="6858000"/>
   <p:notesSz cx="6858000" cy="9144000"/>
@@ -330,7 +331,7 @@
           <a:p>
             <a:fld id="{3FBE3441-0475-49E1-99DF-5CB0DB44F5A9}" type="datetimeFigureOut">
               <a:rPr lang="it-IT" smtClean="0"/>
-              <a:t>24/04/2022</a:t>
+              <a:t>27/04/2022</a:t>
             </a:fld>
             <a:endParaRPr lang="it-IT"/>
           </a:p>
@@ -528,7 +529,7 @@
           <a:p>
             <a:fld id="{3FBE3441-0475-49E1-99DF-5CB0DB44F5A9}" type="datetimeFigureOut">
               <a:rPr lang="it-IT" smtClean="0"/>
-              <a:t>24/04/2022</a:t>
+              <a:t>27/04/2022</a:t>
             </a:fld>
             <a:endParaRPr lang="it-IT"/>
           </a:p>
@@ -736,7 +737,7 @@
           <a:p>
             <a:fld id="{3FBE3441-0475-49E1-99DF-5CB0DB44F5A9}" type="datetimeFigureOut">
               <a:rPr lang="it-IT" smtClean="0"/>
-              <a:t>24/04/2022</a:t>
+              <a:t>27/04/2022</a:t>
             </a:fld>
             <a:endParaRPr lang="it-IT"/>
           </a:p>
@@ -934,7 +935,7 @@
           <a:p>
             <a:fld id="{3FBE3441-0475-49E1-99DF-5CB0DB44F5A9}" type="datetimeFigureOut">
               <a:rPr lang="it-IT" smtClean="0"/>
-              <a:t>24/04/2022</a:t>
+              <a:t>27/04/2022</a:t>
             </a:fld>
             <a:endParaRPr lang="it-IT"/>
           </a:p>
@@ -1209,7 +1210,7 @@
           <a:p>
             <a:fld id="{3FBE3441-0475-49E1-99DF-5CB0DB44F5A9}" type="datetimeFigureOut">
               <a:rPr lang="it-IT" smtClean="0"/>
-              <a:t>24/04/2022</a:t>
+              <a:t>27/04/2022</a:t>
             </a:fld>
             <a:endParaRPr lang="it-IT"/>
           </a:p>
@@ -1474,7 +1475,7 @@
           <a:p>
             <a:fld id="{3FBE3441-0475-49E1-99DF-5CB0DB44F5A9}" type="datetimeFigureOut">
               <a:rPr lang="it-IT" smtClean="0"/>
-              <a:t>24/04/2022</a:t>
+              <a:t>27/04/2022</a:t>
             </a:fld>
             <a:endParaRPr lang="it-IT"/>
           </a:p>
@@ -1886,7 +1887,7 @@
           <a:p>
             <a:fld id="{3FBE3441-0475-49E1-99DF-5CB0DB44F5A9}" type="datetimeFigureOut">
               <a:rPr lang="it-IT" smtClean="0"/>
-              <a:t>24/04/2022</a:t>
+              <a:t>27/04/2022</a:t>
             </a:fld>
             <a:endParaRPr lang="it-IT"/>
           </a:p>
@@ -2027,7 +2028,7 @@
           <a:p>
             <a:fld id="{3FBE3441-0475-49E1-99DF-5CB0DB44F5A9}" type="datetimeFigureOut">
               <a:rPr lang="it-IT" smtClean="0"/>
-              <a:t>24/04/2022</a:t>
+              <a:t>27/04/2022</a:t>
             </a:fld>
             <a:endParaRPr lang="it-IT"/>
           </a:p>
@@ -2140,7 +2141,7 @@
           <a:p>
             <a:fld id="{3FBE3441-0475-49E1-99DF-5CB0DB44F5A9}" type="datetimeFigureOut">
               <a:rPr lang="it-IT" smtClean="0"/>
-              <a:t>24/04/2022</a:t>
+              <a:t>27/04/2022</a:t>
             </a:fld>
             <a:endParaRPr lang="it-IT"/>
           </a:p>
@@ -2451,7 +2452,7 @@
           <a:p>
             <a:fld id="{3FBE3441-0475-49E1-99DF-5CB0DB44F5A9}" type="datetimeFigureOut">
               <a:rPr lang="it-IT" smtClean="0"/>
-              <a:t>24/04/2022</a:t>
+              <a:t>27/04/2022</a:t>
             </a:fld>
             <a:endParaRPr lang="it-IT"/>
           </a:p>
@@ -2739,7 +2740,7 @@
           <a:p>
             <a:fld id="{3FBE3441-0475-49E1-99DF-5CB0DB44F5A9}" type="datetimeFigureOut">
               <a:rPr lang="it-IT" smtClean="0"/>
-              <a:t>24/04/2022</a:t>
+              <a:t>27/04/2022</a:t>
             </a:fld>
             <a:endParaRPr lang="it-IT"/>
           </a:p>
@@ -2980,7 +2981,7 @@
           <a:p>
             <a:fld id="{3FBE3441-0475-49E1-99DF-5CB0DB44F5A9}" type="datetimeFigureOut">
               <a:rPr lang="it-IT" smtClean="0"/>
-              <a:t>24/04/2022</a:t>
+              <a:t>27/04/2022</a:t>
             </a:fld>
             <a:endParaRPr lang="it-IT"/>
           </a:p>
@@ -4282,21 +4283,8 @@
                   <a:schemeClr val="bg1"/>
                 </a:solidFill>
               </a:rPr>
-              <a:t> – Data </a:t>
-            </a:r>
-            <a:r>
-              <a:rPr lang="it-IT" sz="4000" dirty="0" err="1">
-                <a:solidFill>
-                  <a:schemeClr val="bg1"/>
-                </a:solidFill>
-              </a:rPr>
-              <a:t>normalization</a:t>
-            </a:r>
-            <a:endParaRPr lang="it-IT" sz="4000" dirty="0">
-              <a:solidFill>
-                <a:schemeClr val="bg1"/>
-              </a:solidFill>
-            </a:endParaRPr>
+              <a:t> – Input data</a:t>
+            </a:r>
           </a:p>
         </p:txBody>
       </p:sp>
@@ -4428,6 +4416,35 @@
           </a:p>
         </p:txBody>
       </p:sp>
+      <p:pic>
+        <p:nvPicPr>
+          <p:cNvPr id="11" name="Immagine 4">
+            <a:extLst>
+              <a:ext uri="{FF2B5EF4-FFF2-40B4-BE49-F238E27FC236}">
+                <a16:creationId xmlns:a16="http://schemas.microsoft.com/office/drawing/2014/main" id="{F3D1700E-356B-4DD9-8D75-D743F63B36D9}"/>
+              </a:ext>
+            </a:extLst>
+          </p:cNvPr>
+          <p:cNvPicPr>
+            <a:picLocks noChangeAspect="1"/>
+          </p:cNvPicPr>
+          <p:nvPr/>
+        </p:nvPicPr>
+        <p:blipFill rotWithShape="1">
+          <a:blip r:embed="rId2"/>
+          <a:srcRect t="1033"/>
+          <a:stretch/>
+        </p:blipFill>
+        <p:spPr>
+          <a:xfrm>
+            <a:off x="5857336" y="2863970"/>
+            <a:ext cx="5188011" cy="2555006"/>
+          </a:xfrm>
+          <a:prstGeom prst="rect">
+            <a:avLst/>
+          </a:prstGeom>
+        </p:spPr>
+      </p:pic>
       <p:sp>
         <p:nvSpPr>
           <p:cNvPr id="12" name="Segnaposto contenuto 2">
@@ -4446,8 +4463,8 @@
         </p:nvSpPr>
         <p:spPr>
           <a:xfrm>
-            <a:off x="1155548" y="2217343"/>
-            <a:ext cx="4615523" cy="3959619"/>
+            <a:off x="1155549" y="2217343"/>
+            <a:ext cx="4408490" cy="3959619"/>
           </a:xfrm>
         </p:spPr>
         <p:txBody>
@@ -4457,74 +4474,9 @@
           <a:lstStyle/>
           <a:p>
             <a:r>
-              <a:rPr lang="it-IT" sz="2400" dirty="0" err="1"/>
-              <a:t>Transformation</a:t>
-            </a:r>
-            <a:r>
-              <a:rPr lang="it-IT" sz="2400" dirty="0"/>
-              <a:t> </a:t>
-            </a:r>
-            <a:r>
-              <a:rPr lang="it-IT" sz="2400" dirty="0" err="1"/>
-              <a:t>categorical</a:t>
-            </a:r>
-            <a:r>
-              <a:rPr lang="it-IT" sz="2400" dirty="0"/>
-              <a:t> </a:t>
-            </a:r>
-            <a:r>
-              <a:rPr lang="it-IT" sz="2400" dirty="0">
-                <a:sym typeface="Wingdings" panose="05000000000000000000" pitchFamily="2" charset="2"/>
-              </a:rPr>
-              <a:t> non </a:t>
-            </a:r>
-            <a:r>
-              <a:rPr lang="it-IT" sz="2400" dirty="0" err="1">
-                <a:sym typeface="Wingdings" panose="05000000000000000000" pitchFamily="2" charset="2"/>
-              </a:rPr>
-              <a:t>categorical</a:t>
-            </a:r>
-            <a:endParaRPr lang="it-IT" sz="2400" dirty="0">
-              <a:sym typeface="Wingdings" panose="05000000000000000000" pitchFamily="2" charset="2"/>
-            </a:endParaRPr>
-          </a:p>
-          <a:p>
-            <a:r>
-              <a:rPr lang="en-US" sz="2400" dirty="0">
-                <a:sym typeface="Wingdings" panose="05000000000000000000" pitchFamily="2" charset="2"/>
-              </a:rPr>
-              <a:t>Dictionaries</a:t>
-            </a:r>
-            <a:r>
-              <a:rPr lang="it-IT" sz="2400" dirty="0">
-                <a:sym typeface="Wingdings" panose="05000000000000000000" pitchFamily="2" charset="2"/>
-              </a:rPr>
-              <a:t>:</a:t>
-            </a:r>
-          </a:p>
-          <a:p>
-            <a:pPr lvl="1"/>
-            <a:r>
-              <a:rPr lang="it-IT" dirty="0">
-                <a:sym typeface="Wingdings" panose="05000000000000000000" pitchFamily="2" charset="2"/>
-              </a:rPr>
-              <a:t>Encoding</a:t>
-            </a:r>
-          </a:p>
-          <a:p>
-            <a:pPr lvl="1"/>
-            <a:r>
-              <a:rPr lang="it-IT" dirty="0">
-                <a:sym typeface="Wingdings" panose="05000000000000000000" pitchFamily="2" charset="2"/>
-              </a:rPr>
-              <a:t>Decoding</a:t>
-            </a:r>
-            <a:endParaRPr lang="it-IT" dirty="0"/>
-          </a:p>
-          <a:p>
-            <a:endParaRPr lang="it-IT" sz="2400" dirty="0">
-              <a:sym typeface="Wingdings" panose="05000000000000000000" pitchFamily="2" charset="2"/>
-            </a:endParaRPr>
+              <a:rPr lang="en-US" sz="2400" dirty="0"/>
+              <a:t>Original data in CSV/file format</a:t>
+            </a:r>
           </a:p>
         </p:txBody>
       </p:sp>
@@ -4543,7 +4495,7 @@
           <p:nvPr/>
         </p:nvPicPr>
         <p:blipFill>
-          <a:blip r:embed="rId2">
+          <a:blip r:embed="rId3">
             <a:extLst>
               <a:ext uri="{28A0092B-C50C-407E-A947-70E740481C1C}">
                 <a14:useLocalDpi xmlns:a14="http://schemas.microsoft.com/office/drawing/2010/main" val="0"/>
@@ -4564,39 +4516,10 @@
           </a:prstGeom>
         </p:spPr>
       </p:pic>
-      <p:pic>
-        <p:nvPicPr>
-          <p:cNvPr id="14" name="Immagine 12">
-            <a:extLst>
-              <a:ext uri="{FF2B5EF4-FFF2-40B4-BE49-F238E27FC236}">
-                <a16:creationId xmlns:a16="http://schemas.microsoft.com/office/drawing/2014/main" id="{4A5CD821-192F-421E-9F79-41B0436E2C9F}"/>
-              </a:ext>
-            </a:extLst>
-          </p:cNvPr>
-          <p:cNvPicPr>
-            <a:picLocks noChangeAspect="1"/>
-          </p:cNvPicPr>
-          <p:nvPr/>
-        </p:nvPicPr>
-        <p:blipFill rotWithShape="1">
-          <a:blip r:embed="rId3"/>
-          <a:srcRect t="3935"/>
-          <a:stretch/>
-        </p:blipFill>
-        <p:spPr>
-          <a:xfrm>
-            <a:off x="5857336" y="2863969"/>
-            <a:ext cx="5188011" cy="2555007"/>
-          </a:xfrm>
-          <a:prstGeom prst="rect">
-            <a:avLst/>
-          </a:prstGeom>
-        </p:spPr>
-      </p:pic>
     </p:spTree>
     <p:extLst>
       <p:ext uri="{BB962C8B-B14F-4D97-AF65-F5344CB8AC3E}">
-        <p14:creationId xmlns:p14="http://schemas.microsoft.com/office/powerpoint/2010/main" val="1655949306"/>
+        <p14:creationId xmlns:p14="http://schemas.microsoft.com/office/powerpoint/2010/main" val="1980741836"/>
       </p:ext>
     </p:extLst>
   </p:cSld>
@@ -4739,7 +4662,7 @@
                   <a:schemeClr val="bg1"/>
                 </a:solidFill>
               </a:rPr>
-              <a:t> – </a:t>
+              <a:t> – Data </a:t>
             </a:r>
             <a:r>
               <a:rPr lang="it-IT" sz="4000" dirty="0" err="1">
@@ -4747,16 +4670,13 @@
                   <a:schemeClr val="bg1"/>
                 </a:solidFill>
               </a:rPr>
-              <a:t>Partition</a:t>
-            </a:r>
-            <a:r>
-              <a:rPr lang="it-IT" sz="4000" dirty="0">
-                <a:solidFill>
-                  <a:schemeClr val="bg1"/>
-                </a:solidFill>
-              </a:rPr>
-              <a:t> I</a:t>
-            </a:r>
+              <a:t>normalization</a:t>
+            </a:r>
+            <a:endParaRPr lang="it-IT" sz="4000" dirty="0">
+              <a:solidFill>
+                <a:schemeClr val="bg1"/>
+              </a:solidFill>
+            </a:endParaRPr>
           </a:p>
         </p:txBody>
       </p:sp>
@@ -4917,29 +4837,71 @@
           <a:lstStyle/>
           <a:p>
             <a:r>
+              <a:rPr lang="it-IT" sz="2400" dirty="0" err="1"/>
+              <a:t>Transformation</a:t>
+            </a:r>
+            <a:r>
               <a:rPr lang="it-IT" sz="2400" dirty="0"/>
-              <a:t>k = 2</a:t>
-            </a:r>
-          </a:p>
-          <a:p>
+              <a:t> </a:t>
+            </a:r>
             <a:r>
               <a:rPr lang="it-IT" sz="2400" dirty="0" err="1"/>
-              <a:t>QIs</a:t>
+              <a:t>categorical</a:t>
             </a:r>
             <a:r>
               <a:rPr lang="it-IT" sz="2400" dirty="0"/>
-              <a:t>: age, sex, </a:t>
-            </a:r>
-            <a:r>
-              <a:rPr lang="it-IT" sz="2400" dirty="0" err="1"/>
-              <a:t>zip_code</a:t>
-            </a:r>
-            <a:endParaRPr lang="it-IT" sz="2400" dirty="0"/>
-          </a:p>
-          <a:p>
-            <a:pPr marL="0" indent="0">
-              <a:buNone/>
-            </a:pPr>
+              <a:t> </a:t>
+            </a:r>
+            <a:r>
+              <a:rPr lang="it-IT" sz="2400" dirty="0">
+                <a:sym typeface="Wingdings" panose="05000000000000000000" pitchFamily="2" charset="2"/>
+              </a:rPr>
+              <a:t> non </a:t>
+            </a:r>
+            <a:r>
+              <a:rPr lang="it-IT" sz="2400" dirty="0" err="1">
+                <a:sym typeface="Wingdings" panose="05000000000000000000" pitchFamily="2" charset="2"/>
+              </a:rPr>
+              <a:t>categorical</a:t>
+            </a:r>
+            <a:endParaRPr lang="it-IT" sz="2400" dirty="0">
+              <a:sym typeface="Wingdings" panose="05000000000000000000" pitchFamily="2" charset="2"/>
+            </a:endParaRPr>
+          </a:p>
+          <a:p>
+            <a:r>
+              <a:rPr lang="en-US" sz="2400" dirty="0">
+                <a:sym typeface="Wingdings" panose="05000000000000000000" pitchFamily="2" charset="2"/>
+              </a:rPr>
+              <a:t>Dictionaries</a:t>
+            </a:r>
+            <a:r>
+              <a:rPr lang="it-IT" sz="2400" dirty="0">
+                <a:sym typeface="Wingdings" panose="05000000000000000000" pitchFamily="2" charset="2"/>
+              </a:rPr>
+              <a:t>:</a:t>
+            </a:r>
+          </a:p>
+          <a:p>
+            <a:pPr lvl="1"/>
+            <a:r>
+              <a:rPr lang="it-IT" dirty="0">
+                <a:sym typeface="Wingdings" panose="05000000000000000000" pitchFamily="2" charset="2"/>
+              </a:rPr>
+              <a:t>Encoding</a:t>
+            </a:r>
+          </a:p>
+          <a:p>
+            <a:pPr lvl="1"/>
+            <a:r>
+              <a:rPr lang="it-IT" dirty="0">
+                <a:sym typeface="Wingdings" panose="05000000000000000000" pitchFamily="2" charset="2"/>
+              </a:rPr>
+              <a:t>Decoding</a:t>
+            </a:r>
+            <a:endParaRPr lang="it-IT" dirty="0"/>
+          </a:p>
+          <a:p>
             <a:endParaRPr lang="it-IT" sz="2400" dirty="0">
               <a:sym typeface="Wingdings" panose="05000000000000000000" pitchFamily="2" charset="2"/>
             </a:endParaRPr>
@@ -5014,7 +4976,7 @@
     </p:spTree>
     <p:extLst>
       <p:ext uri="{BB962C8B-B14F-4D97-AF65-F5344CB8AC3E}">
-        <p14:creationId xmlns:p14="http://schemas.microsoft.com/office/powerpoint/2010/main" val="1952814763"/>
+        <p14:creationId xmlns:p14="http://schemas.microsoft.com/office/powerpoint/2010/main" val="1655949306"/>
       </p:ext>
     </p:extLst>
   </p:cSld>
@@ -5173,7 +5135,7 @@
                   <a:schemeClr val="bg1"/>
                 </a:solidFill>
               </a:rPr>
-              <a:t> II</a:t>
+              <a:t> I</a:t>
             </a:r>
           </a:p>
         </p:txBody>
@@ -5335,80 +5297,24 @@
           <a:lstStyle/>
           <a:p>
             <a:r>
+              <a:rPr lang="it-IT" sz="2400" dirty="0"/>
+              <a:t>k = 2</a:t>
+            </a:r>
+          </a:p>
+          <a:p>
+            <a:r>
               <a:rPr lang="it-IT" sz="2400" dirty="0" err="1"/>
-              <a:t>dim</a:t>
+              <a:t>QIs</a:t>
             </a:r>
             <a:r>
               <a:rPr lang="it-IT" sz="2400" dirty="0"/>
-              <a:t>: age</a:t>
-            </a:r>
-          </a:p>
-          <a:p>
+              <a:t>: age, sex, </a:t>
+            </a:r>
             <a:r>
               <a:rPr lang="it-IT" sz="2400" dirty="0" err="1"/>
-              <a:t>splitVal</a:t>
-            </a:r>
-            <a:r>
-              <a:rPr lang="it-IT" sz="2400" dirty="0"/>
-              <a:t>: 26.33</a:t>
-            </a:r>
-          </a:p>
-          <a:p>
-            <a:r>
-              <a:rPr lang="it-IT" sz="2400" dirty="0"/>
-              <a:t>no </a:t>
-            </a:r>
-            <a:r>
-              <a:rPr lang="it-IT" sz="2400" dirty="0" err="1"/>
-              <a:t>allowable</a:t>
-            </a:r>
-            <a:r>
-              <a:rPr lang="it-IT" sz="2400" dirty="0"/>
-              <a:t> </a:t>
-            </a:r>
-            <a:r>
-              <a:rPr lang="it-IT" sz="2400" dirty="0" err="1"/>
-              <a:t>multidimensional</a:t>
-            </a:r>
-            <a:r>
-              <a:rPr lang="it-IT" sz="2400" dirty="0"/>
-              <a:t> </a:t>
-            </a:r>
-            <a:r>
-              <a:rPr lang="it-IT" sz="2400" dirty="0" err="1"/>
-              <a:t>cut</a:t>
-            </a:r>
-            <a:r>
-              <a:rPr lang="it-IT" sz="2400" dirty="0"/>
-              <a:t> for </a:t>
-            </a:r>
-            <a:r>
-              <a:rPr lang="it-IT" sz="2400" dirty="0" err="1"/>
-              <a:t>partition</a:t>
-            </a:r>
-            <a:br>
-              <a:rPr lang="it-IT" sz="2400" dirty="0"/>
-            </a:br>
-            <a:r>
-              <a:rPr lang="it-IT" sz="2400" dirty="0"/>
-              <a:t>(</a:t>
-            </a:r>
-            <a:r>
-              <a:rPr lang="it-IT" sz="2400" dirty="0" err="1"/>
-              <a:t>lhs</a:t>
-            </a:r>
-            <a:r>
-              <a:rPr lang="it-IT" sz="2400" dirty="0"/>
-              <a:t>, </a:t>
-            </a:r>
-            <a:r>
-              <a:rPr lang="it-IT" sz="2400" dirty="0" err="1"/>
-              <a:t>rhs</a:t>
-            </a:r>
-            <a:r>
-              <a:rPr lang="it-IT" sz="2400" dirty="0"/>
-              <a:t>)</a:t>
-            </a:r>
+              <a:t>zip_code</a:t>
+            </a:r>
+            <a:endParaRPr lang="it-IT" sz="2400" dirty="0"/>
           </a:p>
           <a:p>
             <a:pPr marL="0" indent="0">
@@ -5458,10 +5364,10 @@
       </p:pic>
       <p:pic>
         <p:nvPicPr>
-          <p:cNvPr id="10" name="Immagine 6" descr="Immagine che contiene tavolo&#10;&#10;Descrizione generata automaticamente">
-            <a:extLst>
-              <a:ext uri="{FF2B5EF4-FFF2-40B4-BE49-F238E27FC236}">
-                <a16:creationId xmlns:a16="http://schemas.microsoft.com/office/drawing/2014/main" id="{76FD4DA5-74A6-493B-AE33-F1F17C05DDDA}"/>
+          <p:cNvPr id="14" name="Immagine 12">
+            <a:extLst>
+              <a:ext uri="{FF2B5EF4-FFF2-40B4-BE49-F238E27FC236}">
+                <a16:creationId xmlns:a16="http://schemas.microsoft.com/office/drawing/2014/main" id="{4A5CD821-192F-421E-9F79-41B0436E2C9F}"/>
               </a:ext>
             </a:extLst>
           </p:cNvPr>
@@ -5470,22 +5376,15 @@
           </p:cNvPicPr>
           <p:nvPr/>
         </p:nvPicPr>
-        <p:blipFill>
-          <a:blip r:embed="rId3">
-            <a:extLst>
-              <a:ext uri="{28A0092B-C50C-407E-A947-70E740481C1C}">
-                <a14:useLocalDpi xmlns:a14="http://schemas.microsoft.com/office/drawing/2010/main" val="0"/>
-              </a:ext>
-            </a:extLst>
-          </a:blip>
-          <a:stretch>
-            <a:fillRect/>
-          </a:stretch>
+        <p:blipFill rotWithShape="1">
+          <a:blip r:embed="rId3"/>
+          <a:srcRect t="3935"/>
+          <a:stretch/>
         </p:blipFill>
         <p:spPr>
           <a:xfrm>
-            <a:off x="5813802" y="2460396"/>
-            <a:ext cx="5469894" cy="3652971"/>
+            <a:off x="5857336" y="2863969"/>
+            <a:ext cx="5188011" cy="2555007"/>
           </a:xfrm>
           <a:prstGeom prst="rect">
             <a:avLst/>
@@ -5495,7 +5394,7 @@
     </p:spTree>
     <p:extLst>
       <p:ext uri="{BB962C8B-B14F-4D97-AF65-F5344CB8AC3E}">
-        <p14:creationId xmlns:p14="http://schemas.microsoft.com/office/powerpoint/2010/main" val="870361565"/>
+        <p14:creationId xmlns:p14="http://schemas.microsoft.com/office/powerpoint/2010/main" val="1952814763"/>
       </p:ext>
     </p:extLst>
   </p:cSld>
@@ -5646,7 +5545,7 @@
                   <a:schemeClr val="bg1"/>
                 </a:solidFill>
               </a:rPr>
-              <a:t>Resulting</a:t>
+              <a:t>Partition</a:t>
             </a:r>
             <a:r>
               <a:rPr lang="it-IT" sz="4000" dirty="0">
@@ -5654,21 +5553,8 @@
                   <a:schemeClr val="bg1"/>
                 </a:solidFill>
               </a:rPr>
-              <a:t> </a:t>
-            </a:r>
-            <a:r>
-              <a:rPr lang="it-IT" sz="4000" dirty="0" err="1">
-                <a:solidFill>
-                  <a:schemeClr val="bg1"/>
-                </a:solidFill>
-              </a:rPr>
-              <a:t>Anonymization</a:t>
-            </a:r>
-            <a:endParaRPr lang="it-IT" sz="4000" dirty="0">
-              <a:solidFill>
-                <a:schemeClr val="bg1"/>
-              </a:solidFill>
-            </a:endParaRPr>
+              <a:t> II</a:t>
+            </a:r>
           </a:p>
         </p:txBody>
       </p:sp>
@@ -5818,8 +5704,8 @@
         </p:nvSpPr>
         <p:spPr>
           <a:xfrm>
-            <a:off x="1155549" y="2217343"/>
-            <a:ext cx="3752882" cy="3959619"/>
+            <a:off x="1155548" y="2217343"/>
+            <a:ext cx="4615523" cy="3959619"/>
           </a:xfrm>
         </p:spPr>
         <p:txBody>
@@ -5829,12 +5715,85 @@
           <a:lstStyle/>
           <a:p>
             <a:r>
-              <a:rPr lang="en-US" sz="2400" dirty="0"/>
-              <a:t>Anonymized data</a:t>
-            </a:r>
-            <a:endParaRPr lang="it-IT" dirty="0"/>
-          </a:p>
-          <a:p>
+              <a:rPr lang="it-IT" sz="2400" dirty="0" err="1"/>
+              <a:t>dim</a:t>
+            </a:r>
+            <a:r>
+              <a:rPr lang="it-IT" sz="2400" dirty="0"/>
+              <a:t>: age</a:t>
+            </a:r>
+          </a:p>
+          <a:p>
+            <a:r>
+              <a:rPr lang="it-IT" sz="2400" dirty="0" err="1"/>
+              <a:t>splitVal</a:t>
+            </a:r>
+            <a:r>
+              <a:rPr lang="it-IT" sz="2400" dirty="0"/>
+              <a:t>: 26.33</a:t>
+            </a:r>
+          </a:p>
+          <a:p>
+            <a:r>
+              <a:rPr lang="it-IT" sz="2400" dirty="0"/>
+              <a:t>no </a:t>
+            </a:r>
+            <a:r>
+              <a:rPr lang="it-IT" sz="2400" dirty="0" err="1"/>
+              <a:t>allowable</a:t>
+            </a:r>
+            <a:r>
+              <a:rPr lang="it-IT" sz="2400" dirty="0"/>
+              <a:t> </a:t>
+            </a:r>
+            <a:r>
+              <a:rPr lang="it-IT" sz="2400" dirty="0" err="1"/>
+              <a:t>multidimensional</a:t>
+            </a:r>
+            <a:r>
+              <a:rPr lang="it-IT" sz="2400" dirty="0"/>
+              <a:t> </a:t>
+            </a:r>
+            <a:r>
+              <a:rPr lang="it-IT" sz="2400" dirty="0" err="1"/>
+              <a:t>cut</a:t>
+            </a:r>
+            <a:r>
+              <a:rPr lang="it-IT" sz="2400" dirty="0"/>
+              <a:t> for </a:t>
+            </a:r>
+            <a:r>
+              <a:rPr lang="it-IT" sz="2400" dirty="0" err="1"/>
+              <a:t>partition</a:t>
+            </a:r>
+            <a:br>
+              <a:rPr lang="it-IT" sz="2400" dirty="0"/>
+            </a:br>
+            <a:r>
+              <a:rPr lang="it-IT" sz="2400" dirty="0"/>
+              <a:t>(</a:t>
+            </a:r>
+            <a:r>
+              <a:rPr lang="it-IT" sz="2400" dirty="0" err="1"/>
+              <a:t>lhs</a:t>
+            </a:r>
+            <a:r>
+              <a:rPr lang="it-IT" sz="2400" dirty="0"/>
+              <a:t>, </a:t>
+            </a:r>
+            <a:r>
+              <a:rPr lang="it-IT" sz="2400" dirty="0" err="1"/>
+              <a:t>rhs</a:t>
+            </a:r>
+            <a:r>
+              <a:rPr lang="it-IT" sz="2400" dirty="0"/>
+              <a:t>)</a:t>
+            </a:r>
+          </a:p>
+          <a:p>
+            <a:pPr marL="0" indent="0">
+              <a:buNone/>
+            </a:pPr>
             <a:endParaRPr lang="it-IT" sz="2400" dirty="0">
               <a:sym typeface="Wingdings" panose="05000000000000000000" pitchFamily="2" charset="2"/>
             </a:endParaRPr>
@@ -5879,10 +5838,10 @@
       </p:pic>
       <p:pic>
         <p:nvPicPr>
-          <p:cNvPr id="9" name="Immagine 4">
-            <a:extLst>
-              <a:ext uri="{FF2B5EF4-FFF2-40B4-BE49-F238E27FC236}">
-                <a16:creationId xmlns:a16="http://schemas.microsoft.com/office/drawing/2014/main" id="{DD7C2E17-8621-4073-8AC5-45D263ADACEF}"/>
+          <p:cNvPr id="10" name="Immagine 6" descr="Immagine che contiene tavolo&#10;&#10;Descrizione generata automaticamente">
+            <a:extLst>
+              <a:ext uri="{FF2B5EF4-FFF2-40B4-BE49-F238E27FC236}">
+                <a16:creationId xmlns:a16="http://schemas.microsoft.com/office/drawing/2014/main" id="{76FD4DA5-74A6-493B-AE33-F1F17C05DDDA}"/>
               </a:ext>
             </a:extLst>
           </p:cNvPr>
@@ -5892,15 +5851,21 @@
           <p:nvPr/>
         </p:nvPicPr>
         <p:blipFill>
-          <a:blip r:embed="rId3"/>
+          <a:blip r:embed="rId3">
+            <a:extLst>
+              <a:ext uri="{28A0092B-C50C-407E-A947-70E740481C1C}">
+                <a14:useLocalDpi xmlns:a14="http://schemas.microsoft.com/office/drawing/2010/main" val="0"/>
+              </a:ext>
+            </a:extLst>
+          </a:blip>
           <a:stretch>
             <a:fillRect/>
           </a:stretch>
         </p:blipFill>
         <p:spPr>
           <a:xfrm>
-            <a:off x="5042769" y="2933114"/>
-            <a:ext cx="6240927" cy="2368275"/>
+            <a:off x="5813802" y="2460396"/>
+            <a:ext cx="5469894" cy="3652971"/>
           </a:xfrm>
           <a:prstGeom prst="rect">
             <a:avLst/>
@@ -5910,7 +5875,7 @@
     </p:spTree>
     <p:extLst>
       <p:ext uri="{BB962C8B-B14F-4D97-AF65-F5344CB8AC3E}">
-        <p14:creationId xmlns:p14="http://schemas.microsoft.com/office/powerpoint/2010/main" val="3657148196"/>
+        <p14:creationId xmlns:p14="http://schemas.microsoft.com/office/powerpoint/2010/main" val="870361565"/>
       </p:ext>
     </p:extLst>
   </p:cSld>
@@ -6045,7 +6010,7 @@
                   <a:schemeClr val="bg1"/>
                 </a:solidFill>
               </a:rPr>
-              <a:t>Experimental data</a:t>
+              <a:t>Example</a:t>
             </a:r>
             <a:r>
               <a:rPr lang="it-IT" sz="4000" dirty="0">
@@ -6061,7 +6026,23 @@
                   <a:schemeClr val="bg1"/>
                 </a:solidFill>
               </a:rPr>
-              <a:t>Metric</a:t>
+              <a:t>Resulting</a:t>
+            </a:r>
+            <a:r>
+              <a:rPr lang="it-IT" sz="4000" dirty="0">
+                <a:solidFill>
+                  <a:schemeClr val="bg1"/>
+                </a:solidFill>
+              </a:rPr>
+              <a:t> </a:t>
+            </a:r>
+            <a:r>
+              <a:rPr lang="it-IT" sz="4000" dirty="0" err="1">
+                <a:solidFill>
+                  <a:schemeClr val="bg1"/>
+                </a:solidFill>
+              </a:rPr>
+              <a:t>Anonymization</a:t>
             </a:r>
             <a:endParaRPr lang="it-IT" sz="4000" dirty="0">
               <a:solidFill>
@@ -6217,6 +6198,405 @@
         </p:nvSpPr>
         <p:spPr>
           <a:xfrm>
+            <a:off x="1155549" y="2217343"/>
+            <a:ext cx="3752882" cy="3959619"/>
+          </a:xfrm>
+        </p:spPr>
+        <p:txBody>
+          <a:bodyPr>
+            <a:normAutofit/>
+          </a:bodyPr>
+          <a:lstStyle/>
+          <a:p>
+            <a:r>
+              <a:rPr lang="en-US" sz="2400" dirty="0"/>
+              <a:t>Anonymized data</a:t>
+            </a:r>
+            <a:endParaRPr lang="it-IT" dirty="0"/>
+          </a:p>
+          <a:p>
+            <a:endParaRPr lang="it-IT" sz="2400" dirty="0">
+              <a:sym typeface="Wingdings" panose="05000000000000000000" pitchFamily="2" charset="2"/>
+            </a:endParaRPr>
+          </a:p>
+        </p:txBody>
+      </p:sp>
+      <p:pic>
+        <p:nvPicPr>
+          <p:cNvPr id="13" name="Picture 12" descr="Icon&#10;&#10;Description automatically generated">
+            <a:extLst>
+              <a:ext uri="{FF2B5EF4-FFF2-40B4-BE49-F238E27FC236}">
+                <a16:creationId xmlns:a16="http://schemas.microsoft.com/office/drawing/2014/main" id="{FD981EFD-5C2D-4A59-9BE0-59EFFF1752B0}"/>
+              </a:ext>
+            </a:extLst>
+          </p:cNvPr>
+          <p:cNvPicPr>
+            <a:picLocks noChangeAspect="1"/>
+          </p:cNvPicPr>
+          <p:nvPr/>
+        </p:nvPicPr>
+        <p:blipFill>
+          <a:blip r:embed="rId2">
+            <a:extLst>
+              <a:ext uri="{28A0092B-C50C-407E-A947-70E740481C1C}">
+                <a14:useLocalDpi xmlns:a14="http://schemas.microsoft.com/office/drawing/2010/main" val="0"/>
+              </a:ext>
+            </a:extLst>
+          </a:blip>
+          <a:stretch>
+            <a:fillRect/>
+          </a:stretch>
+        </p:blipFill>
+        <p:spPr>
+          <a:xfrm>
+            <a:off x="523840" y="637762"/>
+            <a:ext cx="543190" cy="543190"/>
+          </a:xfrm>
+          <a:prstGeom prst="rect">
+            <a:avLst/>
+          </a:prstGeom>
+        </p:spPr>
+      </p:pic>
+      <p:pic>
+        <p:nvPicPr>
+          <p:cNvPr id="9" name="Immagine 4">
+            <a:extLst>
+              <a:ext uri="{FF2B5EF4-FFF2-40B4-BE49-F238E27FC236}">
+                <a16:creationId xmlns:a16="http://schemas.microsoft.com/office/drawing/2014/main" id="{DD7C2E17-8621-4073-8AC5-45D263ADACEF}"/>
+              </a:ext>
+            </a:extLst>
+          </p:cNvPr>
+          <p:cNvPicPr>
+            <a:picLocks noChangeAspect="1"/>
+          </p:cNvPicPr>
+          <p:nvPr/>
+        </p:nvPicPr>
+        <p:blipFill>
+          <a:blip r:embed="rId3"/>
+          <a:stretch>
+            <a:fillRect/>
+          </a:stretch>
+        </p:blipFill>
+        <p:spPr>
+          <a:xfrm>
+            <a:off x="5042769" y="2933114"/>
+            <a:ext cx="6240927" cy="2368275"/>
+          </a:xfrm>
+          <a:prstGeom prst="rect">
+            <a:avLst/>
+          </a:prstGeom>
+        </p:spPr>
+      </p:pic>
+    </p:spTree>
+    <p:extLst>
+      <p:ext uri="{BB962C8B-B14F-4D97-AF65-F5344CB8AC3E}">
+        <p14:creationId xmlns:p14="http://schemas.microsoft.com/office/powerpoint/2010/main" val="3657148196"/>
+      </p:ext>
+    </p:extLst>
+  </p:cSld>
+  <p:clrMapOvr>
+    <a:masterClrMapping/>
+  </p:clrMapOvr>
+</p:sld>
+</file>
+
+<file path=ppt/slides/slide15.xml><?xml version="1.0" encoding="utf-8"?>
+<p:sld xmlns:a="http://schemas.openxmlformats.org/drawingml/2006/main" xmlns:r="http://schemas.openxmlformats.org/officeDocument/2006/relationships" xmlns:p="http://schemas.openxmlformats.org/presentationml/2006/main">
+  <p:cSld>
+    <p:bg>
+      <p:bgPr>
+        <a:solidFill>
+          <a:schemeClr val="bg1"/>
+        </a:solidFill>
+        <a:effectLst/>
+      </p:bgPr>
+    </p:bg>
+    <p:spTree>
+      <p:nvGrpSpPr>
+        <p:cNvPr id="1" name=""/>
+        <p:cNvGrpSpPr/>
+        <p:nvPr/>
+      </p:nvGrpSpPr>
+      <p:grpSpPr>
+        <a:xfrm>
+          <a:off x="0" y="0"/>
+          <a:ext cx="0" cy="0"/>
+          <a:chOff x="0" y="0"/>
+          <a:chExt cx="0" cy="0"/>
+        </a:xfrm>
+      </p:grpSpPr>
+      <p:sp>
+        <p:nvSpPr>
+          <p:cNvPr id="19" name="Rectangle 18">
+            <a:extLst>
+              <a:ext uri="{FF2B5EF4-FFF2-40B4-BE49-F238E27FC236}">
+                <a16:creationId xmlns:a16="http://schemas.microsoft.com/office/drawing/2014/main" id="{70DFC902-7D23-471A-B557-B6B6917D7A0D}"/>
+              </a:ext>
+              <a:ext uri="{C183D7F6-B498-43B3-948B-1728B52AA6E4}">
+                <adec:decorative xmlns:adec="http://schemas.microsoft.com/office/drawing/2017/decorative" val="1"/>
+              </a:ext>
+            </a:extLst>
+          </p:cNvPr>
+          <p:cNvSpPr>
+            <a:spLocks noGrp="1" noRot="1" noChangeAspect="1" noMove="1" noResize="1" noEditPoints="1" noAdjustHandles="1" noChangeArrowheads="1" noChangeShapeType="1" noTextEdit="1"/>
+          </p:cNvSpPr>
+          <p:nvPr>
+            <p:extLst>
+              <p:ext uri="{386F3935-93C4-4BCD-93E2-E3B085C9AB24}">
+                <p16:designElem xmlns:p16="http://schemas.microsoft.com/office/powerpoint/2015/main" val="1"/>
+              </p:ext>
+            </p:extLst>
+          </p:nvPr>
+        </p:nvSpPr>
+        <p:spPr>
+          <a:xfrm>
+            <a:off x="10" y="-5705"/>
+            <a:ext cx="12191990" cy="1694346"/>
+          </a:xfrm>
+          <a:prstGeom prst="rect">
+            <a:avLst/>
+          </a:prstGeom>
+          <a:solidFill>
+            <a:schemeClr val="tx1">
+              <a:lumMod val="85000"/>
+              <a:lumOff val="15000"/>
+            </a:schemeClr>
+          </a:solidFill>
+          <a:ln>
+            <a:noFill/>
+          </a:ln>
+        </p:spPr>
+        <p:style>
+          <a:lnRef idx="2">
+            <a:schemeClr val="accent1">
+              <a:shade val="50000"/>
+            </a:schemeClr>
+          </a:lnRef>
+          <a:fillRef idx="1">
+            <a:schemeClr val="accent1"/>
+          </a:fillRef>
+          <a:effectRef idx="0">
+            <a:schemeClr val="accent1"/>
+          </a:effectRef>
+          <a:fontRef idx="minor">
+            <a:schemeClr val="lt1"/>
+          </a:fontRef>
+        </p:style>
+        <p:txBody>
+          <a:bodyPr rtlCol="0" anchor="ctr"/>
+          <a:lstStyle/>
+          <a:p>
+            <a:pPr algn="ctr"/>
+            <a:endParaRPr lang="en-US"/>
+          </a:p>
+        </p:txBody>
+      </p:sp>
+      <p:sp>
+        <p:nvSpPr>
+          <p:cNvPr id="2" name="Titolo 1">
+            <a:extLst>
+              <a:ext uri="{FF2B5EF4-FFF2-40B4-BE49-F238E27FC236}">
+                <a16:creationId xmlns:a16="http://schemas.microsoft.com/office/drawing/2014/main" id="{D7AB5096-88AB-4ECC-BBD6-6A22A773E427}"/>
+              </a:ext>
+            </a:extLst>
+          </p:cNvPr>
+          <p:cNvSpPr>
+            <a:spLocks noGrp="1"/>
+          </p:cNvSpPr>
+          <p:nvPr>
+            <p:ph type="title"/>
+          </p:nvPr>
+        </p:nvSpPr>
+        <p:spPr>
+          <a:xfrm>
+            <a:off x="1156851" y="637762"/>
+            <a:ext cx="9888496" cy="900131"/>
+          </a:xfrm>
+        </p:spPr>
+        <p:txBody>
+          <a:bodyPr anchor="t">
+            <a:normAutofit/>
+          </a:bodyPr>
+          <a:lstStyle/>
+          <a:p>
+            <a:r>
+              <a:rPr lang="en-US" sz="4000" dirty="0">
+                <a:solidFill>
+                  <a:schemeClr val="bg1"/>
+                </a:solidFill>
+              </a:rPr>
+              <a:t>Experimental data</a:t>
+            </a:r>
+            <a:r>
+              <a:rPr lang="it-IT" sz="4000" dirty="0">
+                <a:solidFill>
+                  <a:schemeClr val="bg1"/>
+                </a:solidFill>
+              </a:rPr>
+              <a:t> – </a:t>
+            </a:r>
+            <a:r>
+              <a:rPr lang="it-IT" sz="4000" dirty="0" err="1">
+                <a:solidFill>
+                  <a:schemeClr val="bg1"/>
+                </a:solidFill>
+              </a:rPr>
+              <a:t>Metric</a:t>
+            </a:r>
+            <a:endParaRPr lang="it-IT" sz="4000" dirty="0">
+              <a:solidFill>
+                <a:schemeClr val="bg1"/>
+              </a:solidFill>
+            </a:endParaRPr>
+          </a:p>
+        </p:txBody>
+      </p:sp>
+      <p:sp>
+        <p:nvSpPr>
+          <p:cNvPr id="21" name="Rectangle 20">
+            <a:extLst>
+              <a:ext uri="{FF2B5EF4-FFF2-40B4-BE49-F238E27FC236}">
+                <a16:creationId xmlns:a16="http://schemas.microsoft.com/office/drawing/2014/main" id="{A55D5633-D557-4DCA-982C-FF36EB7A1C00}"/>
+              </a:ext>
+              <a:ext uri="{C183D7F6-B498-43B3-948B-1728B52AA6E4}">
+                <adec:decorative xmlns:adec="http://schemas.microsoft.com/office/drawing/2017/decorative" val="1"/>
+              </a:ext>
+            </a:extLst>
+          </p:cNvPr>
+          <p:cNvSpPr>
+            <a:spLocks noGrp="1" noRot="1" noChangeAspect="1" noMove="1" noResize="1" noEditPoints="1" noAdjustHandles="1" noChangeArrowheads="1" noChangeShapeType="1" noTextEdit="1"/>
+          </p:cNvSpPr>
+          <p:nvPr>
+            <p:extLst>
+              <p:ext uri="{386F3935-93C4-4BCD-93E2-E3B085C9AB24}">
+                <p16:designElem xmlns:p16="http://schemas.microsoft.com/office/powerpoint/2015/main" val="1"/>
+              </p:ext>
+            </p:extLst>
+          </p:nvPr>
+        </p:nvSpPr>
+        <p:spPr>
+          <a:xfrm>
+            <a:off x="0" y="1688641"/>
+            <a:ext cx="12191990" cy="5169359"/>
+          </a:xfrm>
+          <a:prstGeom prst="rect">
+            <a:avLst/>
+          </a:prstGeom>
+          <a:solidFill>
+            <a:schemeClr val="bg1">
+              <a:lumMod val="95000"/>
+            </a:schemeClr>
+          </a:solidFill>
+          <a:ln>
+            <a:noFill/>
+          </a:ln>
+        </p:spPr>
+        <p:style>
+          <a:lnRef idx="2">
+            <a:schemeClr val="accent1">
+              <a:shade val="50000"/>
+            </a:schemeClr>
+          </a:lnRef>
+          <a:fillRef idx="1">
+            <a:schemeClr val="accent1"/>
+          </a:fillRef>
+          <a:effectRef idx="0">
+            <a:schemeClr val="accent1"/>
+          </a:effectRef>
+          <a:fontRef idx="minor">
+            <a:schemeClr val="lt1"/>
+          </a:fontRef>
+        </p:style>
+        <p:txBody>
+          <a:bodyPr rtlCol="0" anchor="ctr"/>
+          <a:lstStyle/>
+          <a:p>
+            <a:pPr algn="ctr"/>
+            <a:endParaRPr lang="en-US"/>
+          </a:p>
+        </p:txBody>
+      </p:sp>
+      <p:sp>
+        <p:nvSpPr>
+          <p:cNvPr id="23" name="Rectangle 22">
+            <a:extLst>
+              <a:ext uri="{FF2B5EF4-FFF2-40B4-BE49-F238E27FC236}">
+                <a16:creationId xmlns:a16="http://schemas.microsoft.com/office/drawing/2014/main" id="{450D3AD2-FA80-415F-A9CE-54D884561CD7}"/>
+              </a:ext>
+              <a:ext uri="{C183D7F6-B498-43B3-948B-1728B52AA6E4}">
+                <adec:decorative xmlns:adec="http://schemas.microsoft.com/office/drawing/2017/decorative" val="1"/>
+              </a:ext>
+            </a:extLst>
+          </p:cNvPr>
+          <p:cNvSpPr>
+            <a:spLocks noGrp="1" noRot="1" noChangeAspect="1" noMove="1" noResize="1" noEditPoints="1" noAdjustHandles="1" noChangeArrowheads="1" noChangeShapeType="1" noTextEdit="1"/>
+          </p:cNvSpPr>
+          <p:nvPr>
+            <p:extLst>
+              <p:ext uri="{386F3935-93C4-4BCD-93E2-E3B085C9AB24}">
+                <p16:designElem xmlns:p16="http://schemas.microsoft.com/office/powerpoint/2015/main" val="1"/>
+              </p:ext>
+            </p:extLst>
+          </p:nvPr>
+        </p:nvSpPr>
+        <p:spPr>
+          <a:xfrm>
+            <a:off x="1156851" y="2010758"/>
+            <a:ext cx="457190" cy="45719"/>
+          </a:xfrm>
+          <a:prstGeom prst="rect">
+            <a:avLst/>
+          </a:prstGeom>
+          <a:solidFill>
+            <a:schemeClr val="tx1"/>
+          </a:solidFill>
+          <a:ln>
+            <a:noFill/>
+          </a:ln>
+        </p:spPr>
+        <p:style>
+          <a:lnRef idx="2">
+            <a:schemeClr val="accent1">
+              <a:shade val="50000"/>
+            </a:schemeClr>
+          </a:lnRef>
+          <a:fillRef idx="1">
+            <a:schemeClr val="accent1"/>
+          </a:fillRef>
+          <a:effectRef idx="0">
+            <a:schemeClr val="accent1"/>
+          </a:effectRef>
+          <a:fontRef idx="minor">
+            <a:schemeClr val="lt1"/>
+          </a:fontRef>
+        </p:style>
+        <p:txBody>
+          <a:bodyPr rtlCol="0" anchor="ctr"/>
+          <a:lstStyle/>
+          <a:p>
+            <a:pPr algn="ctr"/>
+            <a:endParaRPr lang="en-US"/>
+          </a:p>
+        </p:txBody>
+      </p:sp>
+      <p:sp>
+        <p:nvSpPr>
+          <p:cNvPr id="12" name="Segnaposto contenuto 2">
+            <a:extLst>
+              <a:ext uri="{FF2B5EF4-FFF2-40B4-BE49-F238E27FC236}">
+                <a16:creationId xmlns:a16="http://schemas.microsoft.com/office/drawing/2014/main" id="{8BC6E4D3-B7B1-4BE0-AC41-416B9C9FB027}"/>
+              </a:ext>
+            </a:extLst>
+          </p:cNvPr>
+          <p:cNvSpPr>
+            <a:spLocks noGrp="1"/>
+          </p:cNvSpPr>
+          <p:nvPr>
+            <p:ph idx="1"/>
+          </p:nvPr>
+        </p:nvSpPr>
+        <p:spPr>
+          <a:xfrm>
             <a:off x="1155548" y="2217343"/>
             <a:ext cx="4615523" cy="3959619"/>
           </a:xfrm>
@@ -6331,7 +6711,7 @@
 </p:sld>
 </file>
 
-<file path=ppt/slides/slide15.xml><?xml version="1.0" encoding="utf-8"?>
+<file path=ppt/slides/slide16.xml><?xml version="1.0" encoding="utf-8"?>
 <p:sld xmlns:a="http://schemas.openxmlformats.org/drawingml/2006/main" xmlns:r="http://schemas.openxmlformats.org/officeDocument/2006/relationships" xmlns:p="http://schemas.openxmlformats.org/presentationml/2006/main">
   <p:cSld>
     <p:bg>
@@ -6798,7 +7178,7 @@
 </p:sld>
 </file>
 
-<file path=ppt/slides/slide16.xml><?xml version="1.0" encoding="utf-8"?>
+<file path=ppt/slides/slide17.xml><?xml version="1.0" encoding="utf-8"?>
 <p:sld xmlns:a="http://schemas.openxmlformats.org/drawingml/2006/main" xmlns:r="http://schemas.openxmlformats.org/officeDocument/2006/relationships" xmlns:p="http://schemas.openxmlformats.org/presentationml/2006/main">
   <p:cSld>
     <p:bg>
@@ -7164,7 +7544,7 @@
                   <a:schemeClr val="bg1"/>
                 </a:solidFill>
               </a:rPr>
-              <a:t>Introduction</a:t>
+              <a:t>Introduction - Motivation</a:t>
             </a:r>
           </a:p>
         </p:txBody>
@@ -7490,7 +7870,7 @@
           <a:lstStyle/>
           <a:p>
             <a:pPr algn="ctr"/>
-            <a:endParaRPr lang="en-US"/>
+            <a:endParaRPr lang="en-US" dirty="0"/>
           </a:p>
         </p:txBody>
       </p:sp>
@@ -7523,28 +7903,12 @@
           <a:lstStyle/>
           <a:p>
             <a:r>
-              <a:rPr lang="it-IT" sz="4000" dirty="0">
+              <a:rPr lang="en-US" sz="4000" dirty="0">
                 <a:solidFill>
                   <a:schemeClr val="bg1"/>
                 </a:solidFill>
               </a:rPr>
-              <a:t>Key concepts – Quasi-</a:t>
-            </a:r>
-            <a:r>
-              <a:rPr lang="it-IT" sz="4000" dirty="0" err="1">
-                <a:solidFill>
-                  <a:schemeClr val="bg1"/>
-                </a:solidFill>
-              </a:rPr>
-              <a:t>Identifier</a:t>
-            </a:r>
-            <a:r>
-              <a:rPr lang="it-IT" sz="4000" dirty="0">
-                <a:solidFill>
-                  <a:schemeClr val="bg1"/>
-                </a:solidFill>
-              </a:rPr>
-              <a:t> (QI)</a:t>
+              <a:t>Introduction – Pros vs Cons</a:t>
             </a:r>
           </a:p>
         </p:txBody>
@@ -7701,64 +8065,155 @@
         </p:spPr>
         <p:txBody>
           <a:bodyPr>
-            <a:normAutofit/>
+            <a:noAutofit/>
           </a:bodyPr>
           <a:lstStyle/>
           <a:p>
-            <a:r>
-              <a:rPr lang="en-US" sz="2400" b="0" i="0" dirty="0">
-                <a:effectLst/>
+            <a:pPr marL="0" indent="0">
+              <a:buNone/>
+            </a:pPr>
+            <a:r>
+              <a:rPr lang="en-US" sz="2200" dirty="0"/>
+              <a:t>Pros:</a:t>
+            </a:r>
+            <a:endParaRPr lang="en-US" sz="2200" b="0" i="0" u="none" strike="noStrike" baseline="0" dirty="0">
+              <a:latin typeface="CMSS9"/>
+            </a:endParaRPr>
+          </a:p>
+          <a:p>
+            <a:pPr lvl="1"/>
+            <a:r>
+              <a:rPr lang="en-US" sz="2200" dirty="0">
+                <a:latin typeface="CMSS9"/>
               </a:rPr>
-              <a:t>A QI set is a subset of attributes X</a:t>
-            </a:r>
-            <a:r>
-              <a:rPr lang="en-US" sz="2400" b="0" i="0" baseline="-25000" dirty="0">
-                <a:effectLst/>
+              <a:t>E</a:t>
+            </a:r>
+            <a:r>
+              <a:rPr lang="en-US" sz="2200" b="0" i="0" u="none" strike="noStrike" baseline="0" dirty="0">
+                <a:latin typeface="CMSS9"/>
               </a:rPr>
-              <a:t>1</a:t>
-            </a:r>
-            <a:r>
-              <a:rPr lang="en-US" sz="2400" b="0" i="0" dirty="0">
-                <a:effectLst/>
+              <a:t>quivalence class and the records in the class are indistinguishable</a:t>
+            </a:r>
+            <a:r>
+              <a:rPr lang="it-IT" sz="2200" b="0" i="0" u="none" strike="noStrike" baseline="0" dirty="0">
+                <a:latin typeface="CMSS9"/>
               </a:rPr>
-              <a:t>, ..., </a:t>
-            </a:r>
-            <a:r>
-              <a:rPr lang="en-US" sz="2400" b="0" i="0" dirty="0" err="1">
-                <a:effectLst/>
+              <a:t> from </a:t>
+            </a:r>
+            <a:r>
+              <a:rPr lang="en-US" sz="2200" b="0" i="0" u="none" strike="noStrike" baseline="0" dirty="0">
+                <a:latin typeface="CMSS9"/>
               </a:rPr>
-              <a:t>X</a:t>
-            </a:r>
-            <a:r>
-              <a:rPr lang="en-US" sz="2400" b="0" i="0" baseline="-25000" dirty="0" err="1">
-                <a:effectLst/>
+              <a:t>each</a:t>
+            </a:r>
+            <a:r>
+              <a:rPr lang="it-IT" sz="2200" b="0" i="0" u="none" strike="noStrike" baseline="0" dirty="0">
+                <a:latin typeface="CMSS9"/>
               </a:rPr>
-              <a:t>d</a:t>
-            </a:r>
-            <a:r>
-              <a:rPr lang="en-US" sz="2400" b="0" i="0" dirty="0">
-                <a:effectLst/>
+              <a:t> </a:t>
+            </a:r>
+            <a:r>
+              <a:rPr lang="en-US" sz="2200" b="0" i="0" u="none" strike="noStrike" baseline="0" dirty="0">
+                <a:latin typeface="CMSS9"/>
               </a:rPr>
-              <a:t> in table T that could potentially be used to re-identify individual records.</a:t>
-            </a:r>
-          </a:p>
-          <a:p>
-            <a:r>
-              <a:rPr lang="en-US" sz="2400" b="0" i="0" dirty="0">
-                <a:effectLst/>
+              <a:t>other</a:t>
+            </a:r>
+            <a:r>
+              <a:rPr lang="it-IT" sz="2200" b="0" i="0" u="none" strike="noStrike" baseline="0" dirty="0">
+                <a:latin typeface="CMSS9"/>
               </a:rPr>
-              <a:t>Examples of quasi-identifiers shown in our domain are sex, age and zip code.</a:t>
-            </a:r>
-            <a:endParaRPr lang="it-IT" sz="2400" dirty="0"/>
+              <a:t>;</a:t>
+            </a:r>
+          </a:p>
+          <a:p>
+            <a:pPr lvl="1"/>
+            <a:r>
+              <a:rPr lang="en-US" sz="2200" b="0" i="0" u="none" strike="noStrike" baseline="0" dirty="0">
+                <a:latin typeface="CMSS9"/>
+              </a:rPr>
+              <a:t>Probability of deanonymization is 1/k.</a:t>
+            </a:r>
+            <a:endParaRPr lang="en-US" sz="2200" dirty="0">
+              <a:latin typeface="CMSS9"/>
+            </a:endParaRPr>
+          </a:p>
+          <a:p>
+            <a:pPr marL="0" indent="0" algn="l">
+              <a:buNone/>
+            </a:pPr>
+            <a:r>
+              <a:rPr lang="en-US" sz="2200" dirty="0">
+                <a:latin typeface="CMSS9"/>
+              </a:rPr>
+              <a:t>Cons:</a:t>
+            </a:r>
+          </a:p>
+          <a:p>
+            <a:pPr lvl="1"/>
+            <a:r>
+              <a:rPr lang="en-US" sz="2200" dirty="0">
+                <a:latin typeface="CMSS9"/>
+              </a:rPr>
+              <a:t>Suffer from Homogeneity attacks and C</a:t>
+            </a:r>
+            <a:r>
+              <a:rPr lang="en-US" sz="2200" b="0" i="0" u="none" strike="noStrike" baseline="0" dirty="0">
+                <a:latin typeface="CMSSBX10"/>
+              </a:rPr>
+              <a:t>omplementary</a:t>
+            </a:r>
+            <a:r>
+              <a:rPr lang="it-IT" sz="2200" b="0" i="0" u="none" strike="noStrike" baseline="0" dirty="0">
+                <a:latin typeface="CMSSBX10"/>
+              </a:rPr>
+              <a:t> Release Attack;</a:t>
+            </a:r>
+            <a:endParaRPr lang="en-US" sz="2200" dirty="0">
+              <a:latin typeface="CMSS9"/>
+            </a:endParaRPr>
+          </a:p>
+          <a:p>
+            <a:pPr lvl="1"/>
+            <a:r>
+              <a:rPr lang="en-US" sz="2200" dirty="0">
+                <a:latin typeface="CMSS9"/>
+              </a:rPr>
+              <a:t>Optimal k-anonymization is </a:t>
+            </a:r>
+            <a:r>
+              <a:rPr lang="en-US" sz="2200">
+                <a:latin typeface="CMSS9"/>
+              </a:rPr>
+              <a:t>NP-hard;</a:t>
+            </a:r>
+            <a:endParaRPr lang="en-US" sz="2200" b="0" i="0" u="none" strike="noStrike" baseline="0" dirty="0">
+              <a:latin typeface="CMSS9"/>
+            </a:endParaRPr>
+          </a:p>
+          <a:p>
+            <a:pPr lvl="1"/>
+            <a:r>
+              <a:rPr lang="en-US" sz="2200" b="0" i="0" u="none" strike="noStrike" baseline="0" dirty="0">
+                <a:latin typeface="CMSS9"/>
+              </a:rPr>
+              <a:t>Generalization leads to a highly generic table having very low utility.</a:t>
+            </a:r>
+            <a:r>
+              <a:rPr lang="en-US" sz="2200" dirty="0">
+                <a:latin typeface="CMSS9"/>
+              </a:rPr>
+              <a:t>	</a:t>
+            </a:r>
+            <a:endParaRPr lang="it-IT" sz="2200" dirty="0"/>
           </a:p>
         </p:txBody>
       </p:sp>
       <p:pic>
         <p:nvPicPr>
-          <p:cNvPr id="15" name="Immagine 9">
-            <a:extLst>
-              <a:ext uri="{FF2B5EF4-FFF2-40B4-BE49-F238E27FC236}">
-                <a16:creationId xmlns:a16="http://schemas.microsoft.com/office/drawing/2014/main" id="{583D0FA1-2D69-4E09-A9F4-C7CF64041594}"/>
+          <p:cNvPr id="13" name="Immagine 2">
+            <a:extLst>
+              <a:ext uri="{FF2B5EF4-FFF2-40B4-BE49-F238E27FC236}">
+                <a16:creationId xmlns:a16="http://schemas.microsoft.com/office/drawing/2014/main" id="{B6561607-7DF5-4F46-87B6-956F9C549EE9}"/>
               </a:ext>
             </a:extLst>
           </p:cNvPr>
@@ -7781,8 +8236,8 @@
         </p:blipFill>
         <p:spPr>
           <a:xfrm>
-            <a:off x="552621" y="637762"/>
-            <a:ext cx="594032" cy="594032"/>
+            <a:off x="614518" y="610798"/>
+            <a:ext cx="542328" cy="542328"/>
           </a:xfrm>
           <a:prstGeom prst="rect">
             <a:avLst/>
@@ -7792,7 +8247,7 @@
     </p:spTree>
     <p:extLst>
       <p:ext uri="{BB962C8B-B14F-4D97-AF65-F5344CB8AC3E}">
-        <p14:creationId xmlns:p14="http://schemas.microsoft.com/office/powerpoint/2010/main" val="2252821034"/>
+        <p14:creationId xmlns:p14="http://schemas.microsoft.com/office/powerpoint/2010/main" val="3202011708"/>
       </p:ext>
     </p:extLst>
   </p:cSld>
@@ -7927,7 +8382,7 @@
                   <a:schemeClr val="bg1"/>
                 </a:solidFill>
               </a:rPr>
-              <a:t>Key concepts – </a:t>
+              <a:t>Key concepts – Quasi-</a:t>
             </a:r>
             <a:r>
               <a:rPr lang="it-IT" sz="4000" dirty="0" err="1">
@@ -7935,7 +8390,7 @@
                   <a:schemeClr val="bg1"/>
                 </a:solidFill>
               </a:rPr>
-              <a:t>Equivalence</a:t>
+              <a:t>Identifier</a:t>
             </a:r>
             <a:r>
               <a:rPr lang="it-IT" sz="4000" dirty="0">
@@ -7943,7 +8398,7 @@
                   <a:schemeClr val="bg1"/>
                 </a:solidFill>
               </a:rPr>
-              <a:t> class</a:t>
+              <a:t> (QI)</a:t>
             </a:r>
           </a:p>
         </p:txBody>
@@ -8108,7 +8563,7 @@
               <a:rPr lang="en-US" sz="2400" b="0" i="0" dirty="0">
                 <a:effectLst/>
               </a:rPr>
-              <a:t>With respect to attributes X</a:t>
+              <a:t>A QI set is a subset of attributes X</a:t>
             </a:r>
             <a:r>
               <a:rPr lang="en-US" sz="2400" b="0" i="0" baseline="-25000" dirty="0">
@@ -8138,67 +8593,15 @@
               <a:rPr lang="en-US" sz="2400" b="0" i="0" dirty="0">
                 <a:effectLst/>
               </a:rPr>
-              <a:t> in table T, an equivalence class is the set of all records in T containing identical values (x</a:t>
-            </a:r>
-            <a:r>
-              <a:rPr lang="en-US" sz="2400" b="0" i="0" baseline="-25000" dirty="0">
-                <a:effectLst/>
-              </a:rPr>
-              <a:t>1</a:t>
-            </a:r>
+              <a:t> in table T that could potentially be used to re-identify individual records.</a:t>
+            </a:r>
+          </a:p>
+          <a:p>
             <a:r>
               <a:rPr lang="en-US" sz="2400" b="0" i="0" dirty="0">
                 <a:effectLst/>
               </a:rPr>
-              <a:t>, ..., </a:t>
-            </a:r>
-            <a:r>
-              <a:rPr lang="en-US" sz="2400" b="0" i="0" dirty="0" err="1">
-                <a:effectLst/>
-              </a:rPr>
-              <a:t>x</a:t>
-            </a:r>
-            <a:r>
-              <a:rPr lang="en-US" sz="2400" b="0" i="0" baseline="-25000" dirty="0" err="1">
-                <a:effectLst/>
-              </a:rPr>
-              <a:t>d</a:t>
-            </a:r>
-            <a:r>
-              <a:rPr lang="en-US" sz="2400" b="0" i="0" dirty="0">
-                <a:effectLst/>
-              </a:rPr>
-              <a:t>) for X</a:t>
-            </a:r>
-            <a:r>
-              <a:rPr lang="en-US" sz="2400" b="0" i="0" baseline="-25000" dirty="0">
-                <a:effectLst/>
-              </a:rPr>
-              <a:t>1</a:t>
-            </a:r>
-            <a:r>
-              <a:rPr lang="en-US" sz="2400" b="0" i="0" dirty="0">
-                <a:effectLst/>
-              </a:rPr>
-              <a:t>, ..., </a:t>
-            </a:r>
-            <a:r>
-              <a:rPr lang="en-US" sz="2400" b="0" i="0" dirty="0" err="1">
-                <a:effectLst/>
-              </a:rPr>
-              <a:t>X</a:t>
-            </a:r>
-            <a:r>
-              <a:rPr lang="en-US" sz="2400" b="0" i="0" baseline="-25000" dirty="0" err="1">
-                <a:effectLst/>
-              </a:rPr>
-              <a:t>d</a:t>
-            </a:r>
-            <a:r>
-              <a:rPr lang="en-US" sz="2400" b="0" i="0" dirty="0">
-                <a:effectLst/>
-              </a:rPr>
-              <a:t>.</a:t>
+              <a:t>Examples of quasi-identifiers shown in our domain are sex, age and zip code.</a:t>
             </a:r>
             <a:endParaRPr lang="it-IT" sz="2400" dirty="0"/>
           </a:p>
@@ -8243,7 +8646,7 @@
     </p:spTree>
     <p:extLst>
       <p:ext uri="{BB962C8B-B14F-4D97-AF65-F5344CB8AC3E}">
-        <p14:creationId xmlns:p14="http://schemas.microsoft.com/office/powerpoint/2010/main" val="4187182488"/>
+        <p14:creationId xmlns:p14="http://schemas.microsoft.com/office/powerpoint/2010/main" val="2252821034"/>
       </p:ext>
     </p:extLst>
   </p:cSld>
@@ -8386,13 +8789,16 @@
                   <a:schemeClr val="bg1"/>
                 </a:solidFill>
               </a:rPr>
-              <a:t>Generalization</a:t>
-            </a:r>
-            <a:endParaRPr lang="it-IT" sz="4000" dirty="0">
-              <a:solidFill>
-                <a:schemeClr val="bg1"/>
-              </a:solidFill>
-            </a:endParaRPr>
+              <a:t>Equivalence</a:t>
+            </a:r>
+            <a:r>
+              <a:rPr lang="it-IT" sz="4000" dirty="0">
+                <a:solidFill>
+                  <a:schemeClr val="bg1"/>
+                </a:solidFill>
+              </a:rPr>
+              <a:t> class</a:t>
+            </a:r>
           </a:p>
         </p:txBody>
       </p:sp>
@@ -8553,8 +8959,100 @@
           <a:lstStyle/>
           <a:p>
             <a:r>
-              <a:rPr lang="en-US" sz="2400" dirty="0"/>
-              <a:t>The method of generalization transforms QI values into less specific, but semantically useful values so that records with the same transformed QI values are indistinguishable.</a:t>
+              <a:rPr lang="en-US" sz="2400" b="0" i="0" dirty="0">
+                <a:effectLst/>
+              </a:rPr>
+              <a:t>With respect to attributes X</a:t>
+            </a:r>
+            <a:r>
+              <a:rPr lang="en-US" sz="2400" b="0" i="0" baseline="-25000" dirty="0">
+                <a:effectLst/>
+              </a:rPr>
+              <a:t>1</a:t>
+            </a:r>
+            <a:r>
+              <a:rPr lang="en-US" sz="2400" b="0" i="0" dirty="0">
+                <a:effectLst/>
+              </a:rPr>
+              <a:t>, ..., </a:t>
+            </a:r>
+            <a:r>
+              <a:rPr lang="en-US" sz="2400" b="0" i="0" dirty="0" err="1">
+                <a:effectLst/>
+              </a:rPr>
+              <a:t>X</a:t>
+            </a:r>
+            <a:r>
+              <a:rPr lang="en-US" sz="2400" b="0" i="0" baseline="-25000" dirty="0" err="1">
+                <a:effectLst/>
+              </a:rPr>
+              <a:t>d</a:t>
+            </a:r>
+            <a:r>
+              <a:rPr lang="en-US" sz="2400" b="0" i="0" dirty="0">
+                <a:effectLst/>
+              </a:rPr>
+              <a:t> in table T, an equivalence class is the set of all records in T containing identical values (x</a:t>
+            </a:r>
+            <a:r>
+              <a:rPr lang="en-US" sz="2400" b="0" i="0" baseline="-25000" dirty="0">
+                <a:effectLst/>
+              </a:rPr>
+              <a:t>1</a:t>
+            </a:r>
+            <a:r>
+              <a:rPr lang="en-US" sz="2400" b="0" i="0" dirty="0">
+                <a:effectLst/>
+              </a:rPr>
+              <a:t>, ..., </a:t>
+            </a:r>
+            <a:r>
+              <a:rPr lang="en-US" sz="2400" b="0" i="0" dirty="0" err="1">
+                <a:effectLst/>
+              </a:rPr>
+              <a:t>x</a:t>
+            </a:r>
+            <a:r>
+              <a:rPr lang="en-US" sz="2400" b="0" i="0" baseline="-25000" dirty="0" err="1">
+                <a:effectLst/>
+              </a:rPr>
+              <a:t>d</a:t>
+            </a:r>
+            <a:r>
+              <a:rPr lang="en-US" sz="2400" b="0" i="0" dirty="0">
+                <a:effectLst/>
+              </a:rPr>
+              <a:t>) for X</a:t>
+            </a:r>
+            <a:r>
+              <a:rPr lang="en-US" sz="2400" b="0" i="0" baseline="-25000" dirty="0">
+                <a:effectLst/>
+              </a:rPr>
+              <a:t>1</a:t>
+            </a:r>
+            <a:r>
+              <a:rPr lang="en-US" sz="2400" b="0" i="0" dirty="0">
+                <a:effectLst/>
+              </a:rPr>
+              <a:t>, ..., </a:t>
+            </a:r>
+            <a:r>
+              <a:rPr lang="en-US" sz="2400" b="0" i="0" dirty="0" err="1">
+                <a:effectLst/>
+              </a:rPr>
+              <a:t>X</a:t>
+            </a:r>
+            <a:r>
+              <a:rPr lang="en-US" sz="2400" b="0" i="0" baseline="-25000" dirty="0" err="1">
+                <a:effectLst/>
+              </a:rPr>
+              <a:t>d</a:t>
+            </a:r>
+            <a:r>
+              <a:rPr lang="en-US" sz="2400" b="0" i="0" dirty="0">
+                <a:effectLst/>
+              </a:rPr>
+              <a:t>.</a:t>
             </a:r>
             <a:endParaRPr lang="it-IT" sz="2400" dirty="0"/>
           </a:p>
@@ -8599,7 +9097,7 @@
     </p:spTree>
     <p:extLst>
       <p:ext uri="{BB962C8B-B14F-4D97-AF65-F5344CB8AC3E}">
-        <p14:creationId xmlns:p14="http://schemas.microsoft.com/office/powerpoint/2010/main" val="318308186"/>
+        <p14:creationId xmlns:p14="http://schemas.microsoft.com/office/powerpoint/2010/main" val="4187182488"/>
       </p:ext>
     </p:extLst>
   </p:cSld>
@@ -8734,7 +9232,7 @@
                   <a:schemeClr val="bg1"/>
                 </a:solidFill>
               </a:rPr>
-              <a:t>Key concepts – Local </a:t>
+              <a:t>Key concepts – </a:t>
             </a:r>
             <a:r>
               <a:rPr lang="it-IT" sz="4000" dirty="0" err="1">
@@ -8742,7 +9240,7 @@
                   <a:schemeClr val="bg1"/>
                 </a:solidFill>
               </a:rPr>
-              <a:t>Recoding</a:t>
+              <a:t>Generalization</a:t>
             </a:r>
             <a:endParaRPr lang="it-IT" sz="4000" dirty="0">
               <a:solidFill>
@@ -8910,13 +9408,7 @@
           <a:p>
             <a:r>
               <a:rPr lang="en-US" sz="2400" dirty="0"/>
-              <a:t>With local recoding, individual records are mapped to generalized forms. In this method, the data space is partitioned into different regions and then all records in the same region are mapped to the same generalized record.</a:t>
-            </a:r>
-          </a:p>
-          <a:p>
-            <a:r>
-              <a:rPr lang="en-US" sz="2400" dirty="0"/>
-              <a:t>For example, a value of "60" for age in two records could possibly be mapped to two different intervals of "[55–60]" and "[60–65]" respectively if the two records are partitioned to different regions.</a:t>
+              <a:t>The method of generalization transforms QI values into less specific, but semantically useful values so that records with the same transformed QI values are indistinguishable.</a:t>
             </a:r>
             <a:endParaRPr lang="it-IT" sz="2400" dirty="0"/>
           </a:p>
@@ -8961,7 +9453,7 @@
     </p:spTree>
     <p:extLst>
       <p:ext uri="{BB962C8B-B14F-4D97-AF65-F5344CB8AC3E}">
-        <p14:creationId xmlns:p14="http://schemas.microsoft.com/office/powerpoint/2010/main" val="1371091973"/>
+        <p14:creationId xmlns:p14="http://schemas.microsoft.com/office/powerpoint/2010/main" val="318308186"/>
       </p:ext>
     </p:extLst>
   </p:cSld>
@@ -9096,7 +9588,7 @@
                   <a:schemeClr val="bg1"/>
                 </a:solidFill>
               </a:rPr>
-              <a:t>Key concepts – </a:t>
+              <a:t>Key concepts – Local </a:t>
             </a:r>
             <a:r>
               <a:rPr lang="it-IT" sz="4000" dirty="0" err="1">
@@ -9104,16 +9596,13 @@
                   <a:schemeClr val="bg1"/>
                 </a:solidFill>
               </a:rPr>
-              <a:t>Strict</a:t>
-            </a:r>
-            <a:r>
-              <a:rPr lang="it-IT" sz="4000" dirty="0">
-                <a:solidFill>
-                  <a:schemeClr val="bg1"/>
-                </a:solidFill>
-              </a:rPr>
-              <a:t> model</a:t>
-            </a:r>
+              <a:t>Recoding</a:t>
+            </a:r>
+            <a:endParaRPr lang="it-IT" sz="4000" dirty="0">
+              <a:solidFill>
+                <a:schemeClr val="bg1"/>
+              </a:solidFill>
+            </a:endParaRPr>
           </a:p>
         </p:txBody>
       </p:sp>
@@ -9275,24 +9764,15 @@
           <a:p>
             <a:r>
               <a:rPr lang="en-US" sz="2400" dirty="0"/>
-              <a:t>In the strict model, the algorithm splits a partition in two parts, </a:t>
-            </a:r>
-            <a:r>
-              <a:rPr lang="en-US" sz="2400" dirty="0" err="1"/>
-              <a:t>lhs</a:t>
-            </a:r>
+              <a:t>With local recoding, individual records are mapped to generalized forms. In this method, the data space is partitioned into different regions and then all records in the same region are mapped to the same generalized record.</a:t>
+            </a:r>
+          </a:p>
+          <a:p>
             <a:r>
               <a:rPr lang="en-US" sz="2400" dirty="0"/>
-              <a:t> and </a:t>
-            </a:r>
-            <a:r>
-              <a:rPr lang="en-US" sz="2400" dirty="0" err="1"/>
-              <a:t>rhs</a:t>
-            </a:r>
-            <a:r>
-              <a:rPr lang="en-US" sz="2400" dirty="0"/>
-              <a:t>, by using a split value (median of partition projected on a quasi-identifier). These parts can't contain common split value, so there is no intersection between the two parts.</a:t>
-            </a:r>
+              <a:t>For example, a value of "60" for age in two records could possibly be mapped to two different intervals of "[55–60]" and "[60–65]" respectively if the two records are partitioned to different regions.</a:t>
+            </a:r>
+            <a:endParaRPr lang="it-IT" sz="2400" dirty="0"/>
           </a:p>
         </p:txBody>
       </p:sp>
@@ -9335,7 +9815,7 @@
     </p:spTree>
     <p:extLst>
       <p:ext uri="{BB962C8B-B14F-4D97-AF65-F5344CB8AC3E}">
-        <p14:creationId xmlns:p14="http://schemas.microsoft.com/office/powerpoint/2010/main" val="1253178415"/>
+        <p14:creationId xmlns:p14="http://schemas.microsoft.com/office/powerpoint/2010/main" val="1371091973"/>
       </p:ext>
     </p:extLst>
   </p:cSld>
@@ -9465,12 +9945,20 @@
           <a:lstStyle/>
           <a:p>
             <a:r>
+              <a:rPr lang="it-IT" sz="4000" dirty="0">
+                <a:solidFill>
+                  <a:schemeClr val="bg1"/>
+                </a:solidFill>
+              </a:rPr>
+              <a:t>Key concepts – </a:t>
+            </a:r>
+            <a:r>
               <a:rPr lang="it-IT" sz="4000" dirty="0" err="1">
                 <a:solidFill>
                   <a:schemeClr val="bg1"/>
                 </a:solidFill>
               </a:rPr>
-              <a:t>Algorithm</a:t>
+              <a:t>Strict</a:t>
             </a:r>
             <a:r>
               <a:rPr lang="it-IT" sz="4000" dirty="0">
@@ -9478,23 +9966,7 @@
                   <a:schemeClr val="bg1"/>
                 </a:solidFill>
               </a:rPr>
-              <a:t> - </a:t>
-            </a:r>
-            <a:r>
-              <a:rPr lang="it-IT" sz="4000" dirty="0" err="1">
-                <a:solidFill>
-                  <a:schemeClr val="bg1"/>
-                </a:solidFill>
-              </a:rPr>
-              <a:t>Implementation</a:t>
-            </a:r>
-            <a:r>
-              <a:rPr lang="it-IT" sz="4000" dirty="0">
-                <a:solidFill>
-                  <a:schemeClr val="bg1"/>
-                </a:solidFill>
-              </a:rPr>
-              <a:t> vs Pseudo code</a:t>
+              <a:t> model</a:t>
             </a:r>
           </a:p>
         </p:txBody>
@@ -9627,44 +10099,63 @@
           </a:p>
         </p:txBody>
       </p:sp>
+      <p:sp>
+        <p:nvSpPr>
+          <p:cNvPr id="3" name="Segnaposto contenuto 2">
+            <a:extLst>
+              <a:ext uri="{FF2B5EF4-FFF2-40B4-BE49-F238E27FC236}">
+                <a16:creationId xmlns:a16="http://schemas.microsoft.com/office/drawing/2014/main" id="{B99AADA9-AD7B-41A8-9960-FC96D1F59049}"/>
+              </a:ext>
+            </a:extLst>
+          </p:cNvPr>
+          <p:cNvSpPr>
+            <a:spLocks noGrp="1"/>
+          </p:cNvSpPr>
+          <p:nvPr>
+            <p:ph idx="1"/>
+          </p:nvPr>
+        </p:nvSpPr>
+        <p:spPr>
+          <a:xfrm>
+            <a:off x="1155548" y="2217343"/>
+            <a:ext cx="9880893" cy="3959619"/>
+          </a:xfrm>
+        </p:spPr>
+        <p:txBody>
+          <a:bodyPr>
+            <a:normAutofit/>
+          </a:bodyPr>
+          <a:lstStyle/>
+          <a:p>
+            <a:r>
+              <a:rPr lang="en-US" sz="2400" dirty="0"/>
+              <a:t>In the strict model, the algorithm splits a partition in two parts, </a:t>
+            </a:r>
+            <a:r>
+              <a:rPr lang="en-US" sz="2400" dirty="0" err="1"/>
+              <a:t>lhs</a:t>
+            </a:r>
+            <a:r>
+              <a:rPr lang="en-US" sz="2400" dirty="0"/>
+              <a:t> and </a:t>
+            </a:r>
+            <a:r>
+              <a:rPr lang="en-US" sz="2400" dirty="0" err="1"/>
+              <a:t>rhs</a:t>
+            </a:r>
+            <a:r>
+              <a:rPr lang="en-US" sz="2400" dirty="0"/>
+              <a:t>, by using a split value (median of partition projected on a quasi-identifier). These parts can't contain common split value, so there is no intersection between the two parts.</a:t>
+            </a:r>
+          </a:p>
+        </p:txBody>
+      </p:sp>
       <p:pic>
         <p:nvPicPr>
-          <p:cNvPr id="9" name="Immagine 3">
-            <a:extLst>
-              <a:ext uri="{FF2B5EF4-FFF2-40B4-BE49-F238E27FC236}">
-                <a16:creationId xmlns:a16="http://schemas.microsoft.com/office/drawing/2014/main" id="{08C26C1B-EFC6-498F-9CCF-3E61BEC7F807}"/>
-              </a:ext>
-            </a:extLst>
-          </p:cNvPr>
-          <p:cNvPicPr>
-            <a:picLocks noGrp="1" noChangeAspect="1"/>
-          </p:cNvPicPr>
-          <p:nvPr>
-            <p:ph idx="1"/>
-          </p:nvPr>
-        </p:nvPicPr>
-        <p:blipFill>
-          <a:blip r:embed="rId2"/>
-          <a:stretch>
-            <a:fillRect/>
-          </a:stretch>
-        </p:blipFill>
-        <p:spPr>
-          <a:xfrm>
-            <a:off x="1069858" y="1868900"/>
-            <a:ext cx="7686068" cy="4351338"/>
-          </a:xfrm>
-          <a:prstGeom prst="rect">
-            <a:avLst/>
-          </a:prstGeom>
-        </p:spPr>
-      </p:pic>
-      <p:pic>
-        <p:nvPicPr>
-          <p:cNvPr id="10" name="Segnaposto contenuto 4">
-            <a:extLst>
-              <a:ext uri="{FF2B5EF4-FFF2-40B4-BE49-F238E27FC236}">
-                <a16:creationId xmlns:a16="http://schemas.microsoft.com/office/drawing/2014/main" id="{153D1367-8D71-49B5-BCD0-F499837DD854}"/>
+          <p:cNvPr id="15" name="Immagine 9">
+            <a:extLst>
+              <a:ext uri="{FF2B5EF4-FFF2-40B4-BE49-F238E27FC236}">
+                <a16:creationId xmlns:a16="http://schemas.microsoft.com/office/drawing/2014/main" id="{583D0FA1-2D69-4E09-A9F4-C7CF64041594}"/>
               </a:ext>
             </a:extLst>
           </p:cNvPr>
@@ -9674,37 +10165,7 @@
           <p:nvPr/>
         </p:nvPicPr>
         <p:blipFill>
-          <a:blip r:embed="rId3"/>
-          <a:stretch>
-            <a:fillRect/>
-          </a:stretch>
-        </p:blipFill>
-        <p:spPr>
-          <a:xfrm>
-            <a:off x="6095995" y="3766764"/>
-            <a:ext cx="5026147" cy="2228987"/>
-          </a:xfrm>
-          <a:prstGeom prst="rect">
-            <a:avLst/>
-          </a:prstGeom>
-        </p:spPr>
-      </p:pic>
-      <p:pic>
-        <p:nvPicPr>
-          <p:cNvPr id="8" name="Picture 7" descr="Icon&#10;&#10;Description automatically generated">
-            <a:extLst>
-              <a:ext uri="{FF2B5EF4-FFF2-40B4-BE49-F238E27FC236}">
-                <a16:creationId xmlns:a16="http://schemas.microsoft.com/office/drawing/2014/main" id="{463A0648-789C-4120-9F97-6A5730813ADB}"/>
-              </a:ext>
-            </a:extLst>
-          </p:cNvPr>
-          <p:cNvPicPr>
-            <a:picLocks noChangeAspect="1"/>
-          </p:cNvPicPr>
-          <p:nvPr/>
-        </p:nvPicPr>
-        <p:blipFill>
-          <a:blip r:embed="rId4">
+          <a:blip r:embed="rId2">
             <a:extLst>
               <a:ext uri="{28A0092B-C50C-407E-A947-70E740481C1C}">
                 <a14:useLocalDpi xmlns:a14="http://schemas.microsoft.com/office/drawing/2010/main" val="0"/>
@@ -9717,8 +10178,8 @@
         </p:blipFill>
         <p:spPr>
           <a:xfrm>
-            <a:off x="613662" y="637762"/>
-            <a:ext cx="543189" cy="543189"/>
+            <a:off x="552621" y="637762"/>
+            <a:ext cx="594032" cy="594032"/>
           </a:xfrm>
           <a:prstGeom prst="rect">
             <a:avLst/>
@@ -9728,7 +10189,7 @@
     </p:spTree>
     <p:extLst>
       <p:ext uri="{BB962C8B-B14F-4D97-AF65-F5344CB8AC3E}">
-        <p14:creationId xmlns:p14="http://schemas.microsoft.com/office/powerpoint/2010/main" val="830364506"/>
+        <p14:creationId xmlns:p14="http://schemas.microsoft.com/office/powerpoint/2010/main" val="1253178415"/>
       </p:ext>
     </p:extLst>
   </p:cSld>
@@ -9858,12 +10319,12 @@
           <a:lstStyle/>
           <a:p>
             <a:r>
-              <a:rPr lang="en-US" sz="4000" dirty="0">
+              <a:rPr lang="it-IT" sz="4000" dirty="0" err="1">
                 <a:solidFill>
                   <a:schemeClr val="bg1"/>
                 </a:solidFill>
               </a:rPr>
-              <a:t>Example</a:t>
+              <a:t>Algorithm</a:t>
             </a:r>
             <a:r>
               <a:rPr lang="it-IT" sz="4000" dirty="0">
@@ -9871,7 +10332,23 @@
                   <a:schemeClr val="bg1"/>
                 </a:solidFill>
               </a:rPr>
-              <a:t> – Input data</a:t>
+              <a:t> - </a:t>
+            </a:r>
+            <a:r>
+              <a:rPr lang="it-IT" sz="4000" dirty="0" err="1">
+                <a:solidFill>
+                  <a:schemeClr val="bg1"/>
+                </a:solidFill>
+              </a:rPr>
+              <a:t>Implementation</a:t>
+            </a:r>
+            <a:r>
+              <a:rPr lang="it-IT" sz="4000" dirty="0">
+                <a:solidFill>
+                  <a:schemeClr val="bg1"/>
+                </a:solidFill>
+              </a:rPr>
+              <a:t> vs Pseudo code</a:t>
             </a:r>
           </a:p>
         </p:txBody>
@@ -10006,74 +10483,42 @@
       </p:sp>
       <p:pic>
         <p:nvPicPr>
-          <p:cNvPr id="11" name="Immagine 4">
-            <a:extLst>
-              <a:ext uri="{FF2B5EF4-FFF2-40B4-BE49-F238E27FC236}">
-                <a16:creationId xmlns:a16="http://schemas.microsoft.com/office/drawing/2014/main" id="{F3D1700E-356B-4DD9-8D75-D743F63B36D9}"/>
+          <p:cNvPr id="9" name="Immagine 3">
+            <a:extLst>
+              <a:ext uri="{FF2B5EF4-FFF2-40B4-BE49-F238E27FC236}">
+                <a16:creationId xmlns:a16="http://schemas.microsoft.com/office/drawing/2014/main" id="{08C26C1B-EFC6-498F-9CCF-3E61BEC7F807}"/>
               </a:ext>
             </a:extLst>
           </p:cNvPr>
           <p:cNvPicPr>
-            <a:picLocks noChangeAspect="1"/>
+            <a:picLocks noGrp="1" noChangeAspect="1"/>
           </p:cNvPicPr>
-          <p:nvPr/>
+          <p:nvPr>
+            <p:ph idx="1"/>
+          </p:nvPr>
         </p:nvPicPr>
-        <p:blipFill rotWithShape="1">
+        <p:blipFill>
           <a:blip r:embed="rId2"/>
-          <a:srcRect t="1033"/>
-          <a:stretch/>
+          <a:stretch>
+            <a:fillRect/>
+          </a:stretch>
         </p:blipFill>
         <p:spPr>
           <a:xfrm>
-            <a:off x="5857336" y="2863970"/>
-            <a:ext cx="5188011" cy="2555006"/>
+            <a:off x="1069858" y="1868900"/>
+            <a:ext cx="7686068" cy="4351338"/>
           </a:xfrm>
           <a:prstGeom prst="rect">
             <a:avLst/>
           </a:prstGeom>
         </p:spPr>
       </p:pic>
-      <p:sp>
-        <p:nvSpPr>
-          <p:cNvPr id="12" name="Segnaposto contenuto 2">
-            <a:extLst>
-              <a:ext uri="{FF2B5EF4-FFF2-40B4-BE49-F238E27FC236}">
-                <a16:creationId xmlns:a16="http://schemas.microsoft.com/office/drawing/2014/main" id="{8BC6E4D3-B7B1-4BE0-AC41-416B9C9FB027}"/>
-              </a:ext>
-            </a:extLst>
-          </p:cNvPr>
-          <p:cNvSpPr>
-            <a:spLocks noGrp="1"/>
-          </p:cNvSpPr>
-          <p:nvPr>
-            <p:ph idx="1"/>
-          </p:nvPr>
-        </p:nvSpPr>
-        <p:spPr>
-          <a:xfrm>
-            <a:off x="1155549" y="2217343"/>
-            <a:ext cx="4408490" cy="3959619"/>
-          </a:xfrm>
-        </p:spPr>
-        <p:txBody>
-          <a:bodyPr>
-            <a:normAutofit/>
-          </a:bodyPr>
-          <a:lstStyle/>
-          <a:p>
-            <a:r>
-              <a:rPr lang="en-US" sz="2400" dirty="0"/>
-              <a:t>Original data in CSV/file format</a:t>
-            </a:r>
-          </a:p>
-        </p:txBody>
-      </p:sp>
       <p:pic>
         <p:nvPicPr>
-          <p:cNvPr id="13" name="Picture 12" descr="Icon&#10;&#10;Description automatically generated">
-            <a:extLst>
-              <a:ext uri="{FF2B5EF4-FFF2-40B4-BE49-F238E27FC236}">
-                <a16:creationId xmlns:a16="http://schemas.microsoft.com/office/drawing/2014/main" id="{FD981EFD-5C2D-4A59-9BE0-59EFFF1752B0}"/>
+          <p:cNvPr id="10" name="Segnaposto contenuto 4">
+            <a:extLst>
+              <a:ext uri="{FF2B5EF4-FFF2-40B4-BE49-F238E27FC236}">
+                <a16:creationId xmlns:a16="http://schemas.microsoft.com/office/drawing/2014/main" id="{153D1367-8D71-49B5-BCD0-F499837DD854}"/>
               </a:ext>
             </a:extLst>
           </p:cNvPr>
@@ -10083,7 +10528,37 @@
           <p:nvPr/>
         </p:nvPicPr>
         <p:blipFill>
-          <a:blip r:embed="rId3">
+          <a:blip r:embed="rId3"/>
+          <a:stretch>
+            <a:fillRect/>
+          </a:stretch>
+        </p:blipFill>
+        <p:spPr>
+          <a:xfrm>
+            <a:off x="6095995" y="3766764"/>
+            <a:ext cx="5026147" cy="2228987"/>
+          </a:xfrm>
+          <a:prstGeom prst="rect">
+            <a:avLst/>
+          </a:prstGeom>
+        </p:spPr>
+      </p:pic>
+      <p:pic>
+        <p:nvPicPr>
+          <p:cNvPr id="8" name="Picture 7" descr="Icon&#10;&#10;Description automatically generated">
+            <a:extLst>
+              <a:ext uri="{FF2B5EF4-FFF2-40B4-BE49-F238E27FC236}">
+                <a16:creationId xmlns:a16="http://schemas.microsoft.com/office/drawing/2014/main" id="{463A0648-789C-4120-9F97-6A5730813ADB}"/>
+              </a:ext>
+            </a:extLst>
+          </p:cNvPr>
+          <p:cNvPicPr>
+            <a:picLocks noChangeAspect="1"/>
+          </p:cNvPicPr>
+          <p:nvPr/>
+        </p:nvPicPr>
+        <p:blipFill>
+          <a:blip r:embed="rId4">
             <a:extLst>
               <a:ext uri="{28A0092B-C50C-407E-A947-70E740481C1C}">
                 <a14:useLocalDpi xmlns:a14="http://schemas.microsoft.com/office/drawing/2010/main" val="0"/>
@@ -10096,8 +10571,8 @@
         </p:blipFill>
         <p:spPr>
           <a:xfrm>
-            <a:off x="523840" y="637762"/>
-            <a:ext cx="543190" cy="543190"/>
+            <a:off x="613662" y="637762"/>
+            <a:ext cx="543189" cy="543189"/>
           </a:xfrm>
           <a:prstGeom prst="rect">
             <a:avLst/>
@@ -10107,7 +10582,7 @@
     </p:spTree>
     <p:extLst>
       <p:ext uri="{BB962C8B-B14F-4D97-AF65-F5344CB8AC3E}">
-        <p14:creationId xmlns:p14="http://schemas.microsoft.com/office/powerpoint/2010/main" val="1980741836"/>
+        <p14:creationId xmlns:p14="http://schemas.microsoft.com/office/powerpoint/2010/main" val="830364506"/>
       </p:ext>
     </p:extLst>
   </p:cSld>

</xml_diff>

<commit_message>
Chnaged presentaion. Code refactor.
</commit_message>
<xml_diff>
--- a/Presentation.pptx
+++ b/Presentation.pptx
@@ -331,7 +331,7 @@
           <a:p>
             <a:fld id="{3FBE3441-0475-49E1-99DF-5CB0DB44F5A9}" type="datetimeFigureOut">
               <a:rPr lang="it-IT" smtClean="0"/>
-              <a:t>27/04/2022</a:t>
+              <a:t>30/04/2022</a:t>
             </a:fld>
             <a:endParaRPr lang="it-IT"/>
           </a:p>
@@ -529,7 +529,7 @@
           <a:p>
             <a:fld id="{3FBE3441-0475-49E1-99DF-5CB0DB44F5A9}" type="datetimeFigureOut">
               <a:rPr lang="it-IT" smtClean="0"/>
-              <a:t>27/04/2022</a:t>
+              <a:t>30/04/2022</a:t>
             </a:fld>
             <a:endParaRPr lang="it-IT"/>
           </a:p>
@@ -737,7 +737,7 @@
           <a:p>
             <a:fld id="{3FBE3441-0475-49E1-99DF-5CB0DB44F5A9}" type="datetimeFigureOut">
               <a:rPr lang="it-IT" smtClean="0"/>
-              <a:t>27/04/2022</a:t>
+              <a:t>30/04/2022</a:t>
             </a:fld>
             <a:endParaRPr lang="it-IT"/>
           </a:p>
@@ -935,7 +935,7 @@
           <a:p>
             <a:fld id="{3FBE3441-0475-49E1-99DF-5CB0DB44F5A9}" type="datetimeFigureOut">
               <a:rPr lang="it-IT" smtClean="0"/>
-              <a:t>27/04/2022</a:t>
+              <a:t>30/04/2022</a:t>
             </a:fld>
             <a:endParaRPr lang="it-IT"/>
           </a:p>
@@ -1210,7 +1210,7 @@
           <a:p>
             <a:fld id="{3FBE3441-0475-49E1-99DF-5CB0DB44F5A9}" type="datetimeFigureOut">
               <a:rPr lang="it-IT" smtClean="0"/>
-              <a:t>27/04/2022</a:t>
+              <a:t>30/04/2022</a:t>
             </a:fld>
             <a:endParaRPr lang="it-IT"/>
           </a:p>
@@ -1475,7 +1475,7 @@
           <a:p>
             <a:fld id="{3FBE3441-0475-49E1-99DF-5CB0DB44F5A9}" type="datetimeFigureOut">
               <a:rPr lang="it-IT" smtClean="0"/>
-              <a:t>27/04/2022</a:t>
+              <a:t>30/04/2022</a:t>
             </a:fld>
             <a:endParaRPr lang="it-IT"/>
           </a:p>
@@ -1887,7 +1887,7 @@
           <a:p>
             <a:fld id="{3FBE3441-0475-49E1-99DF-5CB0DB44F5A9}" type="datetimeFigureOut">
               <a:rPr lang="it-IT" smtClean="0"/>
-              <a:t>27/04/2022</a:t>
+              <a:t>30/04/2022</a:t>
             </a:fld>
             <a:endParaRPr lang="it-IT"/>
           </a:p>
@@ -2028,7 +2028,7 @@
           <a:p>
             <a:fld id="{3FBE3441-0475-49E1-99DF-5CB0DB44F5A9}" type="datetimeFigureOut">
               <a:rPr lang="it-IT" smtClean="0"/>
-              <a:t>27/04/2022</a:t>
+              <a:t>30/04/2022</a:t>
             </a:fld>
             <a:endParaRPr lang="it-IT"/>
           </a:p>
@@ -2141,7 +2141,7 @@
           <a:p>
             <a:fld id="{3FBE3441-0475-49E1-99DF-5CB0DB44F5A9}" type="datetimeFigureOut">
               <a:rPr lang="it-IT" smtClean="0"/>
-              <a:t>27/04/2022</a:t>
+              <a:t>30/04/2022</a:t>
             </a:fld>
             <a:endParaRPr lang="it-IT"/>
           </a:p>
@@ -2452,7 +2452,7 @@
           <a:p>
             <a:fld id="{3FBE3441-0475-49E1-99DF-5CB0DB44F5A9}" type="datetimeFigureOut">
               <a:rPr lang="it-IT" smtClean="0"/>
-              <a:t>27/04/2022</a:t>
+              <a:t>30/04/2022</a:t>
             </a:fld>
             <a:endParaRPr lang="it-IT"/>
           </a:p>
@@ -2740,7 +2740,7 @@
           <a:p>
             <a:fld id="{3FBE3441-0475-49E1-99DF-5CB0DB44F5A9}" type="datetimeFigureOut">
               <a:rPr lang="it-IT" smtClean="0"/>
-              <a:t>27/04/2022</a:t>
+              <a:t>30/04/2022</a:t>
             </a:fld>
             <a:endParaRPr lang="it-IT"/>
           </a:p>
@@ -2981,7 +2981,7 @@
           <a:p>
             <a:fld id="{3FBE3441-0475-49E1-99DF-5CB0DB44F5A9}" type="datetimeFigureOut">
               <a:rPr lang="it-IT" smtClean="0"/>
-              <a:t>27/04/2022</a:t>
+              <a:t>30/04/2022</a:t>
             </a:fld>
             <a:endParaRPr lang="it-IT"/>
           </a:p>
@@ -10319,37 +10319,18 @@
           <a:lstStyle/>
           <a:p>
             <a:r>
-              <a:rPr lang="it-IT" sz="4000" dirty="0" err="1">
+              <a:rPr lang="it-IT" sz="4000">
                 <a:solidFill>
                   <a:schemeClr val="bg1"/>
                 </a:solidFill>
               </a:rPr>
-              <a:t>Algorithm</a:t>
-            </a:r>
-            <a:r>
-              <a:rPr lang="it-IT" sz="4000" dirty="0">
-                <a:solidFill>
-                  <a:schemeClr val="bg1"/>
-                </a:solidFill>
-              </a:rPr>
-              <a:t> - </a:t>
-            </a:r>
-            <a:r>
-              <a:rPr lang="it-IT" sz="4000" dirty="0" err="1">
-                <a:solidFill>
-                  <a:schemeClr val="bg1"/>
-                </a:solidFill>
-              </a:rPr>
-              <a:t>Implementation</a:t>
-            </a:r>
-            <a:r>
-              <a:rPr lang="it-IT" sz="4000" dirty="0">
-                <a:solidFill>
-                  <a:schemeClr val="bg1"/>
-                </a:solidFill>
-              </a:rPr>
-              <a:t> vs Pseudo code</a:t>
-            </a:r>
+              <a:t>Algorithm - Implementation vs Pseudo code</a:t>
+            </a:r>
+            <a:endParaRPr lang="it-IT" sz="4000" dirty="0">
+              <a:solidFill>
+                <a:schemeClr val="bg1"/>
+              </a:solidFill>
+            </a:endParaRPr>
           </a:p>
         </p:txBody>
       </p:sp>
@@ -10483,30 +10464,34 @@
       </p:sp>
       <p:pic>
         <p:nvPicPr>
-          <p:cNvPr id="9" name="Immagine 3">
-            <a:extLst>
-              <a:ext uri="{FF2B5EF4-FFF2-40B4-BE49-F238E27FC236}">
-                <a16:creationId xmlns:a16="http://schemas.microsoft.com/office/drawing/2014/main" id="{08C26C1B-EFC6-498F-9CCF-3E61BEC7F807}"/>
+          <p:cNvPr id="8" name="Picture 7" descr="Icon&#10;&#10;Description automatically generated">
+            <a:extLst>
+              <a:ext uri="{FF2B5EF4-FFF2-40B4-BE49-F238E27FC236}">
+                <a16:creationId xmlns:a16="http://schemas.microsoft.com/office/drawing/2014/main" id="{463A0648-789C-4120-9F97-6A5730813ADB}"/>
               </a:ext>
             </a:extLst>
           </p:cNvPr>
           <p:cNvPicPr>
-            <a:picLocks noGrp="1" noChangeAspect="1"/>
+            <a:picLocks noChangeAspect="1"/>
           </p:cNvPicPr>
-          <p:nvPr>
-            <p:ph idx="1"/>
-          </p:nvPr>
+          <p:nvPr/>
         </p:nvPicPr>
         <p:blipFill>
-          <a:blip r:embed="rId2"/>
+          <a:blip r:embed="rId2">
+            <a:extLst>
+              <a:ext uri="{28A0092B-C50C-407E-A947-70E740481C1C}">
+                <a14:useLocalDpi xmlns:a14="http://schemas.microsoft.com/office/drawing/2010/main" val="0"/>
+              </a:ext>
+            </a:extLst>
+          </a:blip>
           <a:stretch>
             <a:fillRect/>
           </a:stretch>
         </p:blipFill>
         <p:spPr>
           <a:xfrm>
-            <a:off x="1069858" y="1868900"/>
-            <a:ext cx="7686068" cy="4351338"/>
+            <a:off x="613662" y="637762"/>
+            <a:ext cx="543189" cy="543189"/>
           </a:xfrm>
           <a:prstGeom prst="rect">
             <a:avLst/>
@@ -10515,10 +10500,10 @@
       </p:pic>
       <p:pic>
         <p:nvPicPr>
-          <p:cNvPr id="10" name="Segnaposto contenuto 4">
-            <a:extLst>
-              <a:ext uri="{FF2B5EF4-FFF2-40B4-BE49-F238E27FC236}">
-                <a16:creationId xmlns:a16="http://schemas.microsoft.com/office/drawing/2014/main" id="{153D1367-8D71-49B5-BCD0-F499837DD854}"/>
+          <p:cNvPr id="6" name="Picture 5">
+            <a:extLst>
+              <a:ext uri="{FF2B5EF4-FFF2-40B4-BE49-F238E27FC236}">
+                <a16:creationId xmlns:a16="http://schemas.microsoft.com/office/drawing/2014/main" id="{90123F9F-5CF0-5465-9E8F-1791DE8F50D0}"/>
               </a:ext>
             </a:extLst>
           </p:cNvPr>
@@ -10535,8 +10520,8 @@
         </p:blipFill>
         <p:spPr>
           <a:xfrm>
-            <a:off x="6095995" y="3766764"/>
-            <a:ext cx="5026147" cy="2228987"/>
+            <a:off x="613662" y="2007521"/>
+            <a:ext cx="8661844" cy="4531597"/>
           </a:xfrm>
           <a:prstGeom prst="rect">
             <a:avLst/>
@@ -10545,10 +10530,10 @@
       </p:pic>
       <p:pic>
         <p:nvPicPr>
-          <p:cNvPr id="8" name="Picture 7" descr="Icon&#10;&#10;Description automatically generated">
-            <a:extLst>
-              <a:ext uri="{FF2B5EF4-FFF2-40B4-BE49-F238E27FC236}">
-                <a16:creationId xmlns:a16="http://schemas.microsoft.com/office/drawing/2014/main" id="{463A0648-789C-4120-9F97-6A5730813ADB}"/>
+          <p:cNvPr id="10" name="Segnaposto contenuto 4">
+            <a:extLst>
+              <a:ext uri="{FF2B5EF4-FFF2-40B4-BE49-F238E27FC236}">
+                <a16:creationId xmlns:a16="http://schemas.microsoft.com/office/drawing/2014/main" id="{153D1367-8D71-49B5-BCD0-F499837DD854}"/>
               </a:ext>
             </a:extLst>
           </p:cNvPr>
@@ -10558,21 +10543,15 @@
           <p:nvPr/>
         </p:nvPicPr>
         <p:blipFill>
-          <a:blip r:embed="rId4">
-            <a:extLst>
-              <a:ext uri="{28A0092B-C50C-407E-A947-70E740481C1C}">
-                <a14:useLocalDpi xmlns:a14="http://schemas.microsoft.com/office/drawing/2010/main" val="0"/>
-              </a:ext>
-            </a:extLst>
-          </a:blip>
+          <a:blip r:embed="rId4"/>
           <a:stretch>
             <a:fillRect/>
           </a:stretch>
         </p:blipFill>
         <p:spPr>
           <a:xfrm>
-            <a:off x="613662" y="637762"/>
-            <a:ext cx="543189" cy="543189"/>
+            <a:off x="6552191" y="3429000"/>
+            <a:ext cx="5026147" cy="2228987"/>
           </a:xfrm>
           <a:prstGeom prst="rect">
             <a:avLst/>

</xml_diff>